<commit_message>
adding try catch and updates to slides
</commit_message>
<xml_diff>
--- a/vimscriptpres.pptx
+++ b/vimscriptpres.pptx
@@ -5,10 +5,10 @@
     <p:sldMasterId id="2147483660" r:id="rId4"/>
   </p:sldMasterIdLst>
   <p:notesMasterIdLst>
-    <p:notesMasterId r:id="rId29"/>
+    <p:notesMasterId r:id="rId31"/>
   </p:notesMasterIdLst>
   <p:handoutMasterIdLst>
-    <p:handoutMasterId r:id="rId30"/>
+    <p:handoutMasterId r:id="rId32"/>
   </p:handoutMasterIdLst>
   <p:sldIdLst>
     <p:sldId id="256" r:id="rId5"/>
@@ -26,15 +26,17 @@
     <p:sldId id="266" r:id="rId17"/>
     <p:sldId id="272" r:id="rId18"/>
     <p:sldId id="273" r:id="rId19"/>
-    <p:sldId id="274" r:id="rId20"/>
-    <p:sldId id="267" r:id="rId21"/>
-    <p:sldId id="275" r:id="rId22"/>
-    <p:sldId id="280" r:id="rId23"/>
-    <p:sldId id="276" r:id="rId24"/>
-    <p:sldId id="277" r:id="rId25"/>
-    <p:sldId id="279" r:id="rId26"/>
-    <p:sldId id="269" r:id="rId27"/>
-    <p:sldId id="260" r:id="rId28"/>
+    <p:sldId id="267" r:id="rId20"/>
+    <p:sldId id="275" r:id="rId21"/>
+    <p:sldId id="280" r:id="rId22"/>
+    <p:sldId id="274" r:id="rId23"/>
+    <p:sldId id="283" r:id="rId24"/>
+    <p:sldId id="276" r:id="rId25"/>
+    <p:sldId id="277" r:id="rId26"/>
+    <p:sldId id="279" r:id="rId27"/>
+    <p:sldId id="281" r:id="rId28"/>
+    <p:sldId id="260" r:id="rId29"/>
+    <p:sldId id="282" r:id="rId30"/>
   </p:sldIdLst>
   <p:sldSz cx="12192000" cy="6858000"/>
   <p:notesSz cx="7010400" cy="9296400"/>
@@ -244,7 +246,7 @@
               <a:rPr lang="en-US" smtClean="0">
                 <a:latin typeface="+mn-lt"/>
               </a:rPr>
-              <a:t>8/22/22</a:t>
+              <a:t>8/23/22</a:t>
             </a:fld>
             <a:endParaRPr lang="en-US" dirty="0">
               <a:latin typeface="+mn-lt"/>
@@ -364,7 +366,7 @@
             <a:fld id="{D7992059-949A-4D84-A84D-82EB5F97947B}" type="datetimeFigureOut">
               <a:rPr lang="en-US" smtClean="0"/>
               <a:pPr/>
-              <a:t>8/22/22</a:t>
+              <a:t>8/23/22</a:t>
             </a:fld>
             <a:endParaRPr lang="en-US" dirty="0"/>
           </a:p>
@@ -12067,7 +12069,7 @@
           <a:p>
             <a:r>
               <a:rPr lang="en-US" dirty="0"/>
-              <a:t>Introduction to Vim script</a:t>
+              <a:t>Vim script - I</a:t>
             </a:r>
           </a:p>
         </p:txBody>
@@ -12096,6 +12098,12 @@
             <a:r>
               <a:rPr lang="en-US" dirty="0"/>
               <a:t>Ketan M</a:t>
+            </a:r>
+          </a:p>
+          <a:p>
+            <a:r>
+              <a:rPr lang="en-US" dirty="0"/>
+              <a:t>NCCS</a:t>
             </a:r>
           </a:p>
         </p:txBody>
@@ -12199,7 +12207,7 @@
           <a:p>
             <a:r>
               <a:rPr lang="en-US" dirty="0"/>
-              <a:t>Slicing like python is available</a:t>
+              <a:t>String slicing like python:</a:t>
             </a:r>
             <a:br>
               <a:rPr lang="en-US" dirty="0"/>
@@ -13508,7 +13516,7 @@
             <p:ph idx="1"/>
             <p:extLst>
               <p:ext uri="{D42A27DB-BD31-4B8C-83A1-F6EECF244321}">
-                <p14:modId xmlns:p14="http://schemas.microsoft.com/office/powerpoint/2010/main" val="3404368659"/>
+                <p14:modId xmlns:p14="http://schemas.microsoft.com/office/powerpoint/2010/main" val="633658062"/>
               </p:ext>
             </p:extLst>
           </p:nvPr>
@@ -13630,7 +13638,7 @@
                     <a:p>
                       <a:r>
                         <a:rPr lang="en-US" dirty="0"/>
-                        <a:t>equal</a:t>
+                        <a:t>Equal</a:t>
                       </a:r>
                     </a:p>
                   </a:txBody>
@@ -13984,7 +13992,7 @@
                     <a:p>
                       <a:r>
                         <a:rPr lang="en-US" dirty="0"/>
-                        <a:t>Regex match</a:t>
+                        <a:t>Matches with</a:t>
                       </a:r>
                     </a:p>
                   </a:txBody>
@@ -14043,7 +14051,7 @@
                     <a:p>
                       <a:r>
                         <a:rPr lang="en-US" dirty="0"/>
-                        <a:t>Regex doesn’t match</a:t>
+                        <a:t>Does not match</a:t>
                       </a:r>
                     </a:p>
                   </a:txBody>
@@ -16181,89 +16189,6 @@
           <p:cNvPr id="2" name="Title 1">
             <a:extLst>
               <a:ext uri="{FF2B5EF4-FFF2-40B4-BE49-F238E27FC236}">
-                <a16:creationId xmlns:a16="http://schemas.microsoft.com/office/drawing/2014/main" id="{7A999D1E-CFBA-4F9B-1930-734DE9598729}"/>
-              </a:ext>
-            </a:extLst>
-          </p:cNvPr>
-          <p:cNvSpPr>
-            <a:spLocks noGrp="1"/>
-          </p:cNvSpPr>
-          <p:nvPr>
-            <p:ph type="title"/>
-          </p:nvPr>
-        </p:nvSpPr>
-        <p:spPr/>
-        <p:txBody>
-          <a:bodyPr/>
-          <a:lstStyle/>
-          <a:p>
-            <a:r>
-              <a:rPr lang="en-US" dirty="0"/>
-              <a:t>LF&amp;E: try ... catch ... finally</a:t>
-            </a:r>
-          </a:p>
-        </p:txBody>
-      </p:sp>
-      <p:sp>
-        <p:nvSpPr>
-          <p:cNvPr id="3" name="Content Placeholder 2">
-            <a:extLst>
-              <a:ext uri="{FF2B5EF4-FFF2-40B4-BE49-F238E27FC236}">
-                <a16:creationId xmlns:a16="http://schemas.microsoft.com/office/drawing/2014/main" id="{F94C8116-FE7B-60AC-8C8B-D9E1CCB155AD}"/>
-              </a:ext>
-            </a:extLst>
-          </p:cNvPr>
-          <p:cNvSpPr>
-            <a:spLocks noGrp="1"/>
-          </p:cNvSpPr>
-          <p:nvPr>
-            <p:ph idx="1"/>
-          </p:nvPr>
-        </p:nvSpPr>
-        <p:spPr/>
-        <p:txBody>
-          <a:bodyPr/>
-          <a:lstStyle/>
-          <a:p>
-            <a:endParaRPr lang="en-US" dirty="0"/>
-          </a:p>
-        </p:txBody>
-      </p:sp>
-    </p:spTree>
-    <p:extLst>
-      <p:ext uri="{BB962C8B-B14F-4D97-AF65-F5344CB8AC3E}">
-        <p14:creationId xmlns:p14="http://schemas.microsoft.com/office/powerpoint/2010/main" val="1224012489"/>
-      </p:ext>
-    </p:extLst>
-  </p:cSld>
-  <p:clrMapOvr>
-    <a:masterClrMapping/>
-  </p:clrMapOvr>
-</p:sld>
-</file>
-
-<file path=ppt/slides/slide17.xml><?xml version="1.0" encoding="utf-8"?>
-<p:sld xmlns:a="http://schemas.openxmlformats.org/drawingml/2006/main" xmlns:r="http://schemas.openxmlformats.org/officeDocument/2006/relationships" xmlns:p="http://schemas.openxmlformats.org/presentationml/2006/main">
-  <p:cSld>
-    <p:spTree>
-      <p:nvGrpSpPr>
-        <p:cNvPr id="1" name=""/>
-        <p:cNvGrpSpPr/>
-        <p:nvPr/>
-      </p:nvGrpSpPr>
-      <p:grpSpPr>
-        <a:xfrm>
-          <a:off x="0" y="0"/>
-          <a:ext cx="0" cy="0"/>
-          <a:chOff x="0" y="0"/>
-          <a:chExt cx="0" cy="0"/>
-        </a:xfrm>
-      </p:grpSpPr>
-      <p:sp>
-        <p:nvSpPr>
-          <p:cNvPr id="2" name="Title 1">
-            <a:extLst>
-              <a:ext uri="{FF2B5EF4-FFF2-40B4-BE49-F238E27FC236}">
                 <a16:creationId xmlns:a16="http://schemas.microsoft.com/office/drawing/2014/main" id="{8DEC714F-2791-FEB1-0ED3-353F59516E41}"/>
               </a:ext>
             </a:extLst>
@@ -16282,15 +16207,7 @@
           <a:p>
             <a:r>
               <a:rPr lang="en-US" dirty="0"/>
-              <a:t>Vim script </a:t>
-            </a:r>
-            <a:r>
-              <a:rPr lang="en-US" dirty="0" err="1"/>
-              <a:t>Builtin</a:t>
-            </a:r>
-            <a:r>
-              <a:rPr lang="en-US" dirty="0"/>
-              <a:t> functions 🤯</a:t>
+              <a:t>Built-in functions 🤯</a:t>
             </a:r>
           </a:p>
         </p:txBody>
@@ -16403,7 +16320,7 @@
 </p:sld>
 </file>
 
-<file path=ppt/slides/slide18.xml><?xml version="1.0" encoding="utf-8"?>
+<file path=ppt/slides/slide17.xml><?xml version="1.0" encoding="utf-8"?>
 <p:sld xmlns:a="http://schemas.openxmlformats.org/drawingml/2006/main" xmlns:r="http://schemas.openxmlformats.org/officeDocument/2006/relationships" xmlns:p="http://schemas.openxmlformats.org/presentationml/2006/main">
   <p:cSld>
     <p:spTree>
@@ -17165,7 +17082,7 @@
 </p:sld>
 </file>
 
-<file path=ppt/slides/slide19.xml><?xml version="1.0" encoding="utf-8"?>
+<file path=ppt/slides/slide18.xml><?xml version="1.0" encoding="utf-8"?>
 <p:sld xmlns:a="http://schemas.openxmlformats.org/drawingml/2006/main" xmlns:r="http://schemas.openxmlformats.org/officeDocument/2006/relationships" xmlns:p="http://schemas.openxmlformats.org/presentationml/2006/main">
   <p:cSld>
     <p:spTree>
@@ -17237,7 +17154,7 @@
         <p:spPr>
           <a:xfrm>
             <a:off x="448056" y="1653735"/>
-            <a:ext cx="3951668" cy="4047778"/>
+            <a:ext cx="3951668" cy="4887696"/>
           </a:xfrm>
         </p:spPr>
         <p:txBody>
@@ -17247,6 +17164,53 @@
             <a:r>
               <a:rPr lang="en-US" dirty="0"/>
               <a:t>Functions may have variable number of arguments</a:t>
+            </a:r>
+          </a:p>
+          <a:p>
+            <a:r>
+              <a:rPr lang="en-US" dirty="0"/>
+              <a:t>Those arguments may be called and used as </a:t>
+            </a:r>
+            <a:r>
+              <a:rPr lang="en-US" dirty="0">
+                <a:latin typeface="Courier New" panose="02070309020205020404" pitchFamily="49" charset="0"/>
+                <a:cs typeface="Courier New" panose="02070309020205020404" pitchFamily="49" charset="0"/>
+              </a:rPr>
+              <a:t>a:1</a:t>
+            </a:r>
+            <a:r>
+              <a:rPr lang="en-US" dirty="0"/>
+              <a:t>, </a:t>
+            </a:r>
+            <a:r>
+              <a:rPr lang="en-US" dirty="0">
+                <a:latin typeface="Courier New" panose="02070309020205020404" pitchFamily="49" charset="0"/>
+                <a:cs typeface="Courier New" panose="02070309020205020404" pitchFamily="49" charset="0"/>
+              </a:rPr>
+              <a:t>a:2</a:t>
+            </a:r>
+            <a:r>
+              <a:rPr lang="en-US" dirty="0"/>
+              <a:t>, ... up to the </a:t>
+            </a:r>
+            <a:r>
+              <a:rPr lang="en-US" b="1" dirty="0"/>
+              <a:t>value in</a:t>
+            </a:r>
+            <a:r>
+              <a:rPr lang="en-US" dirty="0"/>
+              <a:t> </a:t>
+            </a:r>
+            <a:r>
+              <a:rPr lang="en-US" dirty="0">
+                <a:latin typeface="Courier New" panose="02070309020205020404" pitchFamily="49" charset="0"/>
+                <a:cs typeface="Courier New" panose="02070309020205020404" pitchFamily="49" charset="0"/>
+              </a:rPr>
+              <a:t>a:0</a:t>
+            </a:r>
+            <a:r>
+              <a:rPr lang="en-US" dirty="0"/>
+              <a:t> which holds the total count of arguments 🇳🇱</a:t>
             </a:r>
           </a:p>
         </p:txBody>
@@ -17758,6 +17722,545 @@
 </p:sld>
 </file>
 
+<file path=ppt/slides/slide19.xml><?xml version="1.0" encoding="utf-8"?>
+<p:sld xmlns:a="http://schemas.openxmlformats.org/drawingml/2006/main" xmlns:r="http://schemas.openxmlformats.org/officeDocument/2006/relationships" xmlns:p="http://schemas.openxmlformats.org/presentationml/2006/main">
+  <p:cSld>
+    <p:spTree>
+      <p:nvGrpSpPr>
+        <p:cNvPr id="1" name=""/>
+        <p:cNvGrpSpPr/>
+        <p:nvPr/>
+      </p:nvGrpSpPr>
+      <p:grpSpPr>
+        <a:xfrm>
+          <a:off x="0" y="0"/>
+          <a:ext cx="0" cy="0"/>
+          <a:chOff x="0" y="0"/>
+          <a:chExt cx="0" cy="0"/>
+        </a:xfrm>
+      </p:grpSpPr>
+      <p:sp>
+        <p:nvSpPr>
+          <p:cNvPr id="2" name="Title 1">
+            <a:extLst>
+              <a:ext uri="{FF2B5EF4-FFF2-40B4-BE49-F238E27FC236}">
+                <a16:creationId xmlns:a16="http://schemas.microsoft.com/office/drawing/2014/main" id="{7A999D1E-CFBA-4F9B-1930-734DE9598729}"/>
+              </a:ext>
+            </a:extLst>
+          </p:cNvPr>
+          <p:cNvSpPr>
+            <a:spLocks noGrp="1"/>
+          </p:cNvSpPr>
+          <p:nvPr>
+            <p:ph type="title"/>
+          </p:nvPr>
+        </p:nvSpPr>
+        <p:spPr/>
+        <p:txBody>
+          <a:bodyPr/>
+          <a:lstStyle/>
+          <a:p>
+            <a:r>
+              <a:rPr lang="en-US" dirty="0"/>
+              <a:t>LF&amp;E: Exception Handling try ... catch ... finally</a:t>
+            </a:r>
+          </a:p>
+        </p:txBody>
+      </p:sp>
+      <p:sp>
+        <p:nvSpPr>
+          <p:cNvPr id="3" name="Content Placeholder 2">
+            <a:extLst>
+              <a:ext uri="{FF2B5EF4-FFF2-40B4-BE49-F238E27FC236}">
+                <a16:creationId xmlns:a16="http://schemas.microsoft.com/office/drawing/2014/main" id="{F94C8116-FE7B-60AC-8C8B-D9E1CCB155AD}"/>
+              </a:ext>
+            </a:extLst>
+          </p:cNvPr>
+          <p:cNvSpPr>
+            <a:spLocks noGrp="1"/>
+          </p:cNvSpPr>
+          <p:nvPr>
+            <p:ph idx="1"/>
+          </p:nvPr>
+        </p:nvSpPr>
+        <p:spPr>
+          <a:xfrm>
+            <a:off x="306161" y="1653735"/>
+            <a:ext cx="5647945" cy="4047778"/>
+          </a:xfrm>
+        </p:spPr>
+        <p:txBody>
+          <a:bodyPr/>
+          <a:lstStyle/>
+          <a:p>
+            <a:r>
+              <a:rPr lang="en-US" dirty="0"/>
+              <a:t>Similar to other languages</a:t>
+            </a:r>
+          </a:p>
+          <a:p>
+            <a:r>
+              <a:rPr lang="en-US" dirty="0"/>
+              <a:t>An exception is simply a string with an exception number that </a:t>
+            </a:r>
+            <a:r>
+              <a:rPr lang="en-US" dirty="0">
+                <a:latin typeface="Courier New" panose="02070309020205020404" pitchFamily="49" charset="0"/>
+                <a:cs typeface="Courier New" panose="02070309020205020404" pitchFamily="49" charset="0"/>
+              </a:rPr>
+              <a:t>catch</a:t>
+            </a:r>
+            <a:r>
+              <a:rPr lang="en-US" dirty="0"/>
+              <a:t> will regex match🤯</a:t>
+            </a:r>
+          </a:p>
+          <a:p>
+            <a:r>
+              <a:rPr lang="en-US" dirty="0"/>
+              <a:t>There maybe multiple catch commands but only one finally</a:t>
+            </a:r>
+          </a:p>
+          <a:p>
+            <a:endParaRPr lang="en-US" dirty="0"/>
+          </a:p>
+          <a:p>
+            <a:endParaRPr lang="en-US" dirty="0"/>
+          </a:p>
+          <a:p>
+            <a:endParaRPr lang="en-US" dirty="0"/>
+          </a:p>
+        </p:txBody>
+      </p:sp>
+      <p:sp>
+        <p:nvSpPr>
+          <p:cNvPr id="4" name="Content Placeholder 2">
+            <a:extLst>
+              <a:ext uri="{FF2B5EF4-FFF2-40B4-BE49-F238E27FC236}">
+                <a16:creationId xmlns:a16="http://schemas.microsoft.com/office/drawing/2014/main" id="{02F63829-ADDB-B2FB-AEDE-49ED168026A9}"/>
+              </a:ext>
+            </a:extLst>
+          </p:cNvPr>
+          <p:cNvSpPr txBox="1">
+            <a:spLocks/>
+          </p:cNvSpPr>
+          <p:nvPr/>
+        </p:nvSpPr>
+        <p:spPr bwMode="auto">
+          <a:xfrm>
+            <a:off x="5975130" y="1653735"/>
+            <a:ext cx="6216871" cy="4047778"/>
+          </a:xfrm>
+          <a:prstGeom prst="rect">
+            <a:avLst/>
+          </a:prstGeom>
+          <a:noFill/>
+          <a:ln w="9525">
+            <a:solidFill>
+              <a:schemeClr val="accent1"/>
+            </a:solidFill>
+            <a:miter lim="800000"/>
+            <a:headEnd/>
+            <a:tailEnd/>
+          </a:ln>
+        </p:spPr>
+        <p:txBody>
+          <a:bodyPr vert="horz" wrap="square" lIns="91440" tIns="45720" rIns="91440" bIns="45720" numCol="1" anchor="t" anchorCtr="0" compatLnSpc="1">
+            <a:prstTxWarp prst="textNoShape">
+              <a:avLst/>
+            </a:prstTxWarp>
+            <a:noAutofit/>
+          </a:bodyPr>
+          <a:lstStyle>
+            <a:lvl1pPr marL="288925" indent="-288925" algn="l" rtl="0" eaLnBrk="1" fontAlgn="base" hangingPunct="1">
+              <a:lnSpc>
+                <a:spcPct val="90000"/>
+              </a:lnSpc>
+              <a:spcBef>
+                <a:spcPts val="1800"/>
+              </a:spcBef>
+              <a:spcAft>
+                <a:spcPct val="0"/>
+              </a:spcAft>
+              <a:buClr>
+                <a:schemeClr val="tx1"/>
+              </a:buClr>
+              <a:buSzPct val="90000"/>
+              <a:buFont typeface="Century Gothic" panose="020B0502020202020204" pitchFamily="34" charset="0"/>
+              <a:buChar char="•"/>
+              <a:defRPr lang="en-US" sz="2800" kern="1200" dirty="0">
+                <a:solidFill>
+                  <a:schemeClr val="tx1"/>
+                </a:solidFill>
+                <a:latin typeface="Century Gothic" panose="020B0502020202020204" pitchFamily="34" charset="0"/>
+                <a:ea typeface="+mn-ea"/>
+                <a:cs typeface="+mn-cs"/>
+              </a:defRPr>
+            </a:lvl1pPr>
+            <a:lvl2pPr marL="687388" indent="-288925" algn="l" rtl="0" eaLnBrk="1" fontAlgn="base" hangingPunct="1">
+              <a:lnSpc>
+                <a:spcPct val="90000"/>
+              </a:lnSpc>
+              <a:spcBef>
+                <a:spcPts val="800"/>
+              </a:spcBef>
+              <a:spcAft>
+                <a:spcPct val="0"/>
+              </a:spcAft>
+              <a:buClr>
+                <a:schemeClr val="tx1"/>
+              </a:buClr>
+              <a:buSzPct val="90000"/>
+              <a:buFont typeface="Century Gothic" panose="020B0502020202020204" pitchFamily="34" charset="0"/>
+              <a:buChar char="–"/>
+              <a:defRPr sz="2400" kern="1200">
+                <a:solidFill>
+                  <a:schemeClr val="tx1"/>
+                </a:solidFill>
+                <a:latin typeface="+mn-lt"/>
+                <a:ea typeface="+mn-ea"/>
+                <a:cs typeface="Arial" panose="020B0604020202020204" pitchFamily="34" charset="0"/>
+              </a:defRPr>
+            </a:lvl2pPr>
+            <a:lvl3pPr marL="1031875" indent="-288925" algn="l" rtl="0" eaLnBrk="1" fontAlgn="base" hangingPunct="1">
+              <a:lnSpc>
+                <a:spcPct val="90000"/>
+              </a:lnSpc>
+              <a:spcBef>
+                <a:spcPts val="800"/>
+              </a:spcBef>
+              <a:spcAft>
+                <a:spcPct val="0"/>
+              </a:spcAft>
+              <a:buClr>
+                <a:schemeClr val="tx1"/>
+              </a:buClr>
+              <a:buSzPct val="90000"/>
+              <a:buFont typeface="Century Gothic" panose="020B0502020202020204" pitchFamily="34" charset="0"/>
+              <a:buChar char="•"/>
+              <a:defRPr sz="2000" kern="1200">
+                <a:solidFill>
+                  <a:schemeClr val="tx1"/>
+                </a:solidFill>
+                <a:latin typeface="+mn-lt"/>
+                <a:ea typeface="+mn-ea"/>
+                <a:cs typeface="Arial" panose="020B0604020202020204" pitchFamily="34" charset="0"/>
+              </a:defRPr>
+            </a:lvl3pPr>
+            <a:lvl4pPr marL="1144588" indent="-173038" algn="l" rtl="0" eaLnBrk="1" fontAlgn="base" hangingPunct="1">
+              <a:lnSpc>
+                <a:spcPct val="90000"/>
+              </a:lnSpc>
+              <a:spcBef>
+                <a:spcPts val="800"/>
+              </a:spcBef>
+              <a:spcAft>
+                <a:spcPct val="0"/>
+              </a:spcAft>
+              <a:buClr>
+                <a:schemeClr val="tx1"/>
+              </a:buClr>
+              <a:buFont typeface="Arial" charset="0"/>
+              <a:buChar char="–"/>
+              <a:defRPr sz="1800" kern="1200">
+                <a:solidFill>
+                  <a:schemeClr val="tx1"/>
+                </a:solidFill>
+                <a:latin typeface="+mn-lt"/>
+                <a:ea typeface="+mn-ea"/>
+                <a:cs typeface="Arial" panose="020B0604020202020204" pitchFamily="34" charset="0"/>
+              </a:defRPr>
+            </a:lvl4pPr>
+            <a:lvl5pPr marL="1482725" indent="-222250" algn="l" rtl="0" eaLnBrk="1" fontAlgn="base" hangingPunct="1">
+              <a:lnSpc>
+                <a:spcPct val="90000"/>
+              </a:lnSpc>
+              <a:spcBef>
+                <a:spcPts val="600"/>
+              </a:spcBef>
+              <a:spcAft>
+                <a:spcPct val="0"/>
+              </a:spcAft>
+              <a:buClr>
+                <a:schemeClr val="tx1"/>
+              </a:buClr>
+              <a:buFont typeface="Arial" panose="020B0604020202020204" pitchFamily="34" charset="0"/>
+              <a:buChar char="•"/>
+              <a:defRPr sz="1800" kern="1200">
+                <a:solidFill>
+                  <a:schemeClr val="tx1"/>
+                </a:solidFill>
+                <a:latin typeface="+mn-lt"/>
+                <a:ea typeface="+mn-ea"/>
+                <a:cs typeface="Arial" panose="020B0604020202020204" pitchFamily="34" charset="0"/>
+              </a:defRPr>
+            </a:lvl5pPr>
+            <a:lvl6pPr marL="2514600" indent="-228600" algn="l" defTabSz="914400" rtl="0" eaLnBrk="1" latinLnBrk="0" hangingPunct="1">
+              <a:spcBef>
+                <a:spcPct val="20000"/>
+              </a:spcBef>
+              <a:buFont typeface="Arial" pitchFamily="34" charset="0"/>
+              <a:buChar char="•"/>
+              <a:defRPr sz="2000" kern="1200">
+                <a:solidFill>
+                  <a:schemeClr val="tx1"/>
+                </a:solidFill>
+                <a:latin typeface="+mn-lt"/>
+                <a:ea typeface="+mn-ea"/>
+                <a:cs typeface="+mn-cs"/>
+              </a:defRPr>
+            </a:lvl6pPr>
+            <a:lvl7pPr marL="2971800" indent="-228600" algn="l" defTabSz="914400" rtl="0" eaLnBrk="1" latinLnBrk="0" hangingPunct="1">
+              <a:spcBef>
+                <a:spcPct val="20000"/>
+              </a:spcBef>
+              <a:buFont typeface="Arial" pitchFamily="34" charset="0"/>
+              <a:buChar char="•"/>
+              <a:defRPr sz="2000" kern="1200">
+                <a:solidFill>
+                  <a:schemeClr val="tx1"/>
+                </a:solidFill>
+                <a:latin typeface="+mn-lt"/>
+                <a:ea typeface="+mn-ea"/>
+                <a:cs typeface="+mn-cs"/>
+              </a:defRPr>
+            </a:lvl7pPr>
+            <a:lvl8pPr marL="3429000" indent="-228600" algn="l" defTabSz="914400" rtl="0" eaLnBrk="1" latinLnBrk="0" hangingPunct="1">
+              <a:spcBef>
+                <a:spcPct val="20000"/>
+              </a:spcBef>
+              <a:buFont typeface="Arial" pitchFamily="34" charset="0"/>
+              <a:buChar char="•"/>
+              <a:defRPr sz="2000" kern="1200">
+                <a:solidFill>
+                  <a:schemeClr val="tx1"/>
+                </a:solidFill>
+                <a:latin typeface="+mn-lt"/>
+                <a:ea typeface="+mn-ea"/>
+                <a:cs typeface="+mn-cs"/>
+              </a:defRPr>
+            </a:lvl8pPr>
+            <a:lvl9pPr marL="3886200" indent="-228600" algn="l" defTabSz="914400" rtl="0" eaLnBrk="1" latinLnBrk="0" hangingPunct="1">
+              <a:spcBef>
+                <a:spcPct val="20000"/>
+              </a:spcBef>
+              <a:buFont typeface="Arial" pitchFamily="34" charset="0"/>
+              <a:buChar char="•"/>
+              <a:defRPr sz="2000" kern="1200">
+                <a:solidFill>
+                  <a:schemeClr val="tx1"/>
+                </a:solidFill>
+                <a:latin typeface="+mn-lt"/>
+                <a:ea typeface="+mn-ea"/>
+                <a:cs typeface="+mn-cs"/>
+              </a:defRPr>
+            </a:lvl9pPr>
+          </a:lstStyle>
+          <a:p>
+            <a:pPr marL="0" indent="0">
+              <a:buNone/>
+            </a:pPr>
+            <a:r>
+              <a:rPr lang="en-US" sz="2000" dirty="0">
+                <a:latin typeface="Courier New" panose="02070309020205020404" pitchFamily="49" charset="0"/>
+                <a:cs typeface="Courier New" panose="02070309020205020404" pitchFamily="49" charset="0"/>
+              </a:rPr>
+              <a:t>try</a:t>
+            </a:r>
+            <a:br>
+              <a:rPr lang="en-US" sz="2000" dirty="0">
+                <a:latin typeface="Courier New" panose="02070309020205020404" pitchFamily="49" charset="0"/>
+                <a:cs typeface="Courier New" panose="02070309020205020404" pitchFamily="49" charset="0"/>
+              </a:rPr>
+            </a:br>
+            <a:r>
+              <a:rPr lang="en-US" sz="2000" dirty="0">
+                <a:latin typeface="Courier New" panose="02070309020205020404" pitchFamily="49" charset="0"/>
+                <a:cs typeface="Courier New" panose="02070309020205020404" pitchFamily="49" charset="0"/>
+              </a:rPr>
+              <a:t>  call </a:t>
+            </a:r>
+            <a:r>
+              <a:rPr lang="en-US" sz="2000" dirty="0" err="1">
+                <a:latin typeface="Courier New" panose="02070309020205020404" pitchFamily="49" charset="0"/>
+                <a:cs typeface="Courier New" panose="02070309020205020404" pitchFamily="49" charset="0"/>
+              </a:rPr>
+              <a:t>Updatefile</a:t>
+            </a:r>
+            <a:r>
+              <a:rPr lang="en-US" sz="2000" dirty="0">
+                <a:latin typeface="Courier New" panose="02070309020205020404" pitchFamily="49" charset="0"/>
+                <a:cs typeface="Courier New" panose="02070309020205020404" pitchFamily="49" charset="0"/>
+              </a:rPr>
+              <a:t>(“/</a:t>
+            </a:r>
+            <a:r>
+              <a:rPr lang="en-US" sz="2000" dirty="0" err="1">
+                <a:latin typeface="Courier New" panose="02070309020205020404" pitchFamily="49" charset="0"/>
+                <a:cs typeface="Courier New" panose="02070309020205020404" pitchFamily="49" charset="0"/>
+              </a:rPr>
+              <a:t>tmp</a:t>
+            </a:r>
+            <a:r>
+              <a:rPr lang="en-US" sz="2000" dirty="0">
+                <a:latin typeface="Courier New" panose="02070309020205020404" pitchFamily="49" charset="0"/>
+                <a:cs typeface="Courier New" panose="02070309020205020404" pitchFamily="49" charset="0"/>
+              </a:rPr>
+              <a:t>/</a:t>
+            </a:r>
+            <a:r>
+              <a:rPr lang="en-US" sz="2000" dirty="0" err="1">
+                <a:latin typeface="Courier New" panose="02070309020205020404" pitchFamily="49" charset="0"/>
+                <a:cs typeface="Courier New" panose="02070309020205020404" pitchFamily="49" charset="0"/>
+              </a:rPr>
+              <a:t>data.txt</a:t>
+            </a:r>
+            <a:r>
+              <a:rPr lang="en-US" sz="2000" dirty="0">
+                <a:latin typeface="Courier New" panose="02070309020205020404" pitchFamily="49" charset="0"/>
+                <a:cs typeface="Courier New" panose="02070309020205020404" pitchFamily="49" charset="0"/>
+              </a:rPr>
+              <a:t>”)</a:t>
+            </a:r>
+            <a:br>
+              <a:rPr lang="en-US" sz="2000" dirty="0">
+                <a:latin typeface="Courier New" panose="02070309020205020404" pitchFamily="49" charset="0"/>
+                <a:cs typeface="Courier New" panose="02070309020205020404" pitchFamily="49" charset="0"/>
+              </a:rPr>
+            </a:br>
+            <a:r>
+              <a:rPr lang="en-US" sz="2000" dirty="0">
+                <a:latin typeface="Courier New" panose="02070309020205020404" pitchFamily="49" charset="0"/>
+                <a:cs typeface="Courier New" panose="02070309020205020404" pitchFamily="49" charset="0"/>
+              </a:rPr>
+              <a:t>catch /E484:/</a:t>
+            </a:r>
+            <a:br>
+              <a:rPr lang="en-US" sz="2000" dirty="0">
+                <a:latin typeface="Courier New" panose="02070309020205020404" pitchFamily="49" charset="0"/>
+                <a:cs typeface="Courier New" panose="02070309020205020404" pitchFamily="49" charset="0"/>
+              </a:rPr>
+            </a:br>
+            <a:r>
+              <a:rPr lang="en-US" sz="2000" dirty="0">
+                <a:latin typeface="Courier New" panose="02070309020205020404" pitchFamily="49" charset="0"/>
+                <a:cs typeface="Courier New" panose="02070309020205020404" pitchFamily="49" charset="0"/>
+              </a:rPr>
+              <a:t>  echo “Sorry file not found”</a:t>
+            </a:r>
+            <a:br>
+              <a:rPr lang="en-US" sz="2000" dirty="0">
+                <a:latin typeface="Courier New" panose="02070309020205020404" pitchFamily="49" charset="0"/>
+                <a:cs typeface="Courier New" panose="02070309020205020404" pitchFamily="49" charset="0"/>
+              </a:rPr>
+            </a:br>
+            <a:r>
+              <a:rPr lang="en-US" sz="2000" dirty="0">
+                <a:latin typeface="Courier New" panose="02070309020205020404" pitchFamily="49" charset="0"/>
+                <a:cs typeface="Courier New" panose="02070309020205020404" pitchFamily="49" charset="0"/>
+              </a:rPr>
+              <a:t>catch /E21:/</a:t>
+            </a:r>
+            <a:br>
+              <a:rPr lang="en-US" sz="2000" dirty="0">
+                <a:latin typeface="Courier New" panose="02070309020205020404" pitchFamily="49" charset="0"/>
+                <a:cs typeface="Courier New" panose="02070309020205020404" pitchFamily="49" charset="0"/>
+              </a:rPr>
+            </a:br>
+            <a:r>
+              <a:rPr lang="en-US" sz="2000" dirty="0">
+                <a:latin typeface="Courier New" panose="02070309020205020404" pitchFamily="49" charset="0"/>
+                <a:cs typeface="Courier New" panose="02070309020205020404" pitchFamily="49" charset="0"/>
+              </a:rPr>
+              <a:t>  echo “Sorry file is not writable”</a:t>
+            </a:r>
+            <a:br>
+              <a:rPr lang="en-US" sz="2000" dirty="0">
+                <a:latin typeface="Courier New" panose="02070309020205020404" pitchFamily="49" charset="0"/>
+                <a:cs typeface="Courier New" panose="02070309020205020404" pitchFamily="49" charset="0"/>
+              </a:rPr>
+            </a:br>
+            <a:r>
+              <a:rPr lang="en-US" sz="2000" dirty="0">
+                <a:latin typeface="Courier New" panose="02070309020205020404" pitchFamily="49" charset="0"/>
+                <a:cs typeface="Courier New" panose="02070309020205020404" pitchFamily="49" charset="0"/>
+              </a:rPr>
+              <a:t>finally</a:t>
+            </a:r>
+            <a:br>
+              <a:rPr lang="en-US" sz="2000" dirty="0">
+                <a:latin typeface="Courier New" panose="02070309020205020404" pitchFamily="49" charset="0"/>
+                <a:cs typeface="Courier New" panose="02070309020205020404" pitchFamily="49" charset="0"/>
+              </a:rPr>
+            </a:br>
+            <a:r>
+              <a:rPr lang="en-US" sz="2000" dirty="0">
+                <a:latin typeface="Courier New" panose="02070309020205020404" pitchFamily="49" charset="0"/>
+                <a:cs typeface="Courier New" panose="02070309020205020404" pitchFamily="49" charset="0"/>
+              </a:rPr>
+              <a:t>  call </a:t>
+            </a:r>
+            <a:r>
+              <a:rPr lang="en-US" sz="2000" dirty="0" err="1">
+                <a:latin typeface="Courier New" panose="02070309020205020404" pitchFamily="49" charset="0"/>
+                <a:cs typeface="Courier New" panose="02070309020205020404" pitchFamily="49" charset="0"/>
+              </a:rPr>
+              <a:t>Wrapup</a:t>
+            </a:r>
+            <a:r>
+              <a:rPr lang="en-US" sz="2000" dirty="0">
+                <a:latin typeface="Courier New" panose="02070309020205020404" pitchFamily="49" charset="0"/>
+                <a:cs typeface="Courier New" panose="02070309020205020404" pitchFamily="49" charset="0"/>
+              </a:rPr>
+              <a:t>(</a:t>
+            </a:r>
+            <a:r>
+              <a:rPr lang="en-US" sz="2000" dirty="0" err="1">
+                <a:latin typeface="Courier New" panose="02070309020205020404" pitchFamily="49" charset="0"/>
+                <a:cs typeface="Courier New" panose="02070309020205020404" pitchFamily="49" charset="0"/>
+              </a:rPr>
+              <a:t>foobar</a:t>
+            </a:r>
+            <a:r>
+              <a:rPr lang="en-US" sz="2000" dirty="0">
+                <a:latin typeface="Courier New" panose="02070309020205020404" pitchFamily="49" charset="0"/>
+                <a:cs typeface="Courier New" panose="02070309020205020404" pitchFamily="49" charset="0"/>
+              </a:rPr>
+              <a:t>)</a:t>
+            </a:r>
+            <a:br>
+              <a:rPr lang="en-US" sz="2000" dirty="0">
+                <a:latin typeface="Courier New" panose="02070309020205020404" pitchFamily="49" charset="0"/>
+                <a:cs typeface="Courier New" panose="02070309020205020404" pitchFamily="49" charset="0"/>
+              </a:rPr>
+            </a:br>
+            <a:r>
+              <a:rPr lang="en-US" sz="2000" dirty="0" err="1">
+                <a:latin typeface="Courier New" panose="02070309020205020404" pitchFamily="49" charset="0"/>
+                <a:cs typeface="Courier New" panose="02070309020205020404" pitchFamily="49" charset="0"/>
+              </a:rPr>
+              <a:t>endtry</a:t>
+            </a:r>
+            <a:endParaRPr lang="en-US" sz="2000" dirty="0">
+              <a:latin typeface="Courier New" panose="02070309020205020404" pitchFamily="49" charset="0"/>
+              <a:cs typeface="Courier New" panose="02070309020205020404" pitchFamily="49" charset="0"/>
+            </a:endParaRPr>
+          </a:p>
+        </p:txBody>
+      </p:sp>
+    </p:spTree>
+    <p:extLst>
+      <p:ext uri="{BB962C8B-B14F-4D97-AF65-F5344CB8AC3E}">
+        <p14:creationId xmlns:p14="http://schemas.microsoft.com/office/powerpoint/2010/main" val="1224012489"/>
+      </p:ext>
+    </p:extLst>
+  </p:cSld>
+  <p:clrMapOvr>
+    <a:masterClrMapping/>
+  </p:clrMapOvr>
+</p:sld>
+</file>
+
 <file path=ppt/slides/slide2.xml><?xml version="1.0" encoding="utf-8"?>
 <p:sld xmlns:a="http://schemas.openxmlformats.org/drawingml/2006/main" xmlns:r="http://schemas.openxmlformats.org/officeDocument/2006/relationships" xmlns:p="http://schemas.openxmlformats.org/presentationml/2006/main">
   <p:cSld>
@@ -17892,6 +18395,82 @@
           </a:p>
         </p:txBody>
       </p:sp>
+      <p:sp>
+        <p:nvSpPr>
+          <p:cNvPr id="4" name="TextBox 3">
+            <a:extLst>
+              <a:ext uri="{FF2B5EF4-FFF2-40B4-BE49-F238E27FC236}">
+                <a16:creationId xmlns:a16="http://schemas.microsoft.com/office/drawing/2014/main" id="{FD46C6D8-D9BA-3A30-D739-F2DFC8D80670}"/>
+              </a:ext>
+            </a:extLst>
+          </p:cNvPr>
+          <p:cNvSpPr txBox="1"/>
+          <p:nvPr/>
+        </p:nvSpPr>
+        <p:spPr>
+          <a:xfrm>
+            <a:off x="6253655" y="6024220"/>
+            <a:ext cx="5801710" cy="348557"/>
+          </a:xfrm>
+          <a:prstGeom prst="rect">
+            <a:avLst/>
+          </a:prstGeom>
+          <a:noFill/>
+          <a:ln>
+            <a:solidFill>
+              <a:schemeClr val="accent1"/>
+            </a:solidFill>
+          </a:ln>
+        </p:spPr>
+        <p:txBody>
+          <a:bodyPr wrap="square" rtlCol="0">
+            <a:spAutoFit/>
+          </a:bodyPr>
+          <a:lstStyle/>
+          <a:p>
+            <a:pPr>
+              <a:lnSpc>
+                <a:spcPct val="90000"/>
+              </a:lnSpc>
+            </a:pPr>
+            <a:r>
+              <a:rPr lang="en-US" dirty="0">
+                <a:latin typeface="Courier New" panose="02070309020205020404" pitchFamily="49" charset="0"/>
+                <a:cs typeface="Courier New" panose="02070309020205020404" pitchFamily="49" charset="0"/>
+              </a:rPr>
+              <a:t>https://</a:t>
+            </a:r>
+            <a:r>
+              <a:rPr lang="en-US" dirty="0" err="1">
+                <a:latin typeface="Courier New" panose="02070309020205020404" pitchFamily="49" charset="0"/>
+                <a:cs typeface="Courier New" panose="02070309020205020404" pitchFamily="49" charset="0"/>
+              </a:rPr>
+              <a:t>github.com</a:t>
+            </a:r>
+            <a:r>
+              <a:rPr lang="en-US" dirty="0">
+                <a:latin typeface="Courier New" panose="02070309020205020404" pitchFamily="49" charset="0"/>
+                <a:cs typeface="Courier New" panose="02070309020205020404" pitchFamily="49" charset="0"/>
+              </a:rPr>
+              <a:t>/</a:t>
+            </a:r>
+            <a:r>
+              <a:rPr lang="en-US" dirty="0" err="1">
+                <a:latin typeface="Courier New" panose="02070309020205020404" pitchFamily="49" charset="0"/>
+                <a:cs typeface="Courier New" panose="02070309020205020404" pitchFamily="49" charset="0"/>
+              </a:rPr>
+              <a:t>ketancmaheshwari</a:t>
+            </a:r>
+            <a:r>
+              <a:rPr lang="en-US" dirty="0">
+                <a:latin typeface="Courier New" panose="02070309020205020404" pitchFamily="49" charset="0"/>
+                <a:cs typeface="Courier New" panose="02070309020205020404" pitchFamily="49" charset="0"/>
+              </a:rPr>
+              <a:t>/vim</a:t>
+            </a:r>
+          </a:p>
+        </p:txBody>
+      </p:sp>
     </p:spTree>
     <p:extLst>
       <p:ext uri="{BB962C8B-B14F-4D97-AF65-F5344CB8AC3E}">
@@ -17906,6 +18485,795 @@
 </file>
 
 <file path=ppt/slides/slide20.xml><?xml version="1.0" encoding="utf-8"?>
+<p:sld xmlns:a="http://schemas.openxmlformats.org/drawingml/2006/main" xmlns:r="http://schemas.openxmlformats.org/officeDocument/2006/relationships" xmlns:p="http://schemas.openxmlformats.org/presentationml/2006/main">
+  <p:cSld>
+    <p:spTree>
+      <p:nvGrpSpPr>
+        <p:cNvPr id="1" name=""/>
+        <p:cNvGrpSpPr/>
+        <p:nvPr/>
+      </p:nvGrpSpPr>
+      <p:grpSpPr>
+        <a:xfrm>
+          <a:off x="0" y="0"/>
+          <a:ext cx="0" cy="0"/>
+          <a:chOff x="0" y="0"/>
+          <a:chExt cx="0" cy="0"/>
+        </a:xfrm>
+      </p:grpSpPr>
+      <p:sp>
+        <p:nvSpPr>
+          <p:cNvPr id="2" name="Title 1">
+            <a:extLst>
+              <a:ext uri="{FF2B5EF4-FFF2-40B4-BE49-F238E27FC236}">
+                <a16:creationId xmlns:a16="http://schemas.microsoft.com/office/drawing/2014/main" id="{1571504A-9819-17B7-C12A-81CF076E49AE}"/>
+              </a:ext>
+            </a:extLst>
+          </p:cNvPr>
+          <p:cNvSpPr>
+            <a:spLocks noGrp="1"/>
+          </p:cNvSpPr>
+          <p:nvPr>
+            <p:ph type="title"/>
+          </p:nvPr>
+        </p:nvSpPr>
+        <p:spPr/>
+        <p:txBody>
+          <a:bodyPr/>
+          <a:lstStyle/>
+          <a:p>
+            <a:r>
+              <a:rPr lang="en-US" dirty="0"/>
+              <a:t>Function Qualifiers</a:t>
+            </a:r>
+          </a:p>
+        </p:txBody>
+      </p:sp>
+      <p:sp>
+        <p:nvSpPr>
+          <p:cNvPr id="3" name="Content Placeholder 2">
+            <a:extLst>
+              <a:ext uri="{FF2B5EF4-FFF2-40B4-BE49-F238E27FC236}">
+                <a16:creationId xmlns:a16="http://schemas.microsoft.com/office/drawing/2014/main" id="{CB1E7CA0-0549-2043-C355-60D63CE8702F}"/>
+              </a:ext>
+            </a:extLst>
+          </p:cNvPr>
+          <p:cNvSpPr>
+            <a:spLocks noGrp="1"/>
+          </p:cNvSpPr>
+          <p:nvPr>
+            <p:ph idx="1"/>
+          </p:nvPr>
+        </p:nvSpPr>
+        <p:spPr>
+          <a:xfrm>
+            <a:off x="448056" y="1237594"/>
+            <a:ext cx="5464014" cy="5052846"/>
+          </a:xfrm>
+        </p:spPr>
+        <p:txBody>
+          <a:bodyPr/>
+          <a:lstStyle/>
+          <a:p>
+            <a:r>
+              <a:rPr lang="en-US" dirty="0"/>
+              <a:t>Functions may be qualified with terms to give them special meaning or control them in other ways</a:t>
+            </a:r>
+          </a:p>
+          <a:p>
+            <a:r>
+              <a:rPr lang="en-US" dirty="0" err="1"/>
+              <a:t>eg.</a:t>
+            </a:r>
+            <a:r>
+              <a:rPr lang="en-US" dirty="0"/>
+              <a:t>, a function qualified with </a:t>
+            </a:r>
+            <a:r>
+              <a:rPr lang="en-US" dirty="0">
+                <a:latin typeface="Courier New" panose="02070309020205020404" pitchFamily="49" charset="0"/>
+                <a:cs typeface="Courier New" panose="02070309020205020404" pitchFamily="49" charset="0"/>
+              </a:rPr>
+              <a:t>range</a:t>
+            </a:r>
+            <a:r>
+              <a:rPr lang="en-US" dirty="0">
+                <a:latin typeface="+mn-lt"/>
+                <a:cs typeface="Courier New" panose="02070309020205020404" pitchFamily="49" charset="0"/>
+              </a:rPr>
+              <a:t> will work on a range of lines. </a:t>
+            </a:r>
+            <a:r>
+              <a:rPr lang="en-US" dirty="0" err="1">
+                <a:latin typeface="+mn-lt"/>
+                <a:cs typeface="Courier New" panose="02070309020205020404" pitchFamily="49" charset="0"/>
+              </a:rPr>
+              <a:t>Countwords</a:t>
+            </a:r>
+            <a:r>
+              <a:rPr lang="en-US" dirty="0">
+                <a:latin typeface="+mn-lt"/>
+                <a:cs typeface="Courier New" panose="02070309020205020404" pitchFamily="49" charset="0"/>
+              </a:rPr>
+              <a:t> will be invoked as:</a:t>
+            </a:r>
+            <a:br>
+              <a:rPr lang="en-US" dirty="0">
+                <a:latin typeface="+mn-lt"/>
+                <a:cs typeface="Courier New" panose="02070309020205020404" pitchFamily="49" charset="0"/>
+              </a:rPr>
+            </a:br>
+            <a:r>
+              <a:rPr lang="en-US" dirty="0">
+                <a:latin typeface="Courier New" panose="02070309020205020404" pitchFamily="49" charset="0"/>
+                <a:cs typeface="Courier New" panose="02070309020205020404" pitchFamily="49" charset="0"/>
+              </a:rPr>
+              <a:t>:10,20call </a:t>
+            </a:r>
+            <a:r>
+              <a:rPr lang="en-US" dirty="0" err="1">
+                <a:latin typeface="Courier New" panose="02070309020205020404" pitchFamily="49" charset="0"/>
+                <a:cs typeface="Courier New" panose="02070309020205020404" pitchFamily="49" charset="0"/>
+              </a:rPr>
+              <a:t>Countwords</a:t>
+            </a:r>
+            <a:r>
+              <a:rPr lang="en-US" dirty="0">
+                <a:latin typeface="Courier New" panose="02070309020205020404" pitchFamily="49" charset="0"/>
+                <a:cs typeface="Courier New" panose="02070309020205020404" pitchFamily="49" charset="0"/>
+              </a:rPr>
+              <a:t>()</a:t>
+            </a:r>
+            <a:br>
+              <a:rPr lang="en-US" dirty="0">
+                <a:latin typeface="+mn-lt"/>
+                <a:cs typeface="Courier New" panose="02070309020205020404" pitchFamily="49" charset="0"/>
+              </a:rPr>
+            </a:br>
+            <a:r>
+              <a:rPr lang="en-US" dirty="0" err="1">
+                <a:latin typeface="Courier New" panose="02070309020205020404" pitchFamily="49" charset="0"/>
+                <a:cs typeface="Courier New" panose="02070309020205020404" pitchFamily="49" charset="0"/>
+              </a:rPr>
+              <a:t>a:firstline</a:t>
+            </a:r>
+            <a:r>
+              <a:rPr lang="en-US" dirty="0">
+                <a:latin typeface="+mn-lt"/>
+                <a:cs typeface="Courier New" panose="02070309020205020404" pitchFamily="49" charset="0"/>
+              </a:rPr>
+              <a:t>, </a:t>
+            </a:r>
+            <a:r>
+              <a:rPr lang="en-US" dirty="0" err="1">
+                <a:latin typeface="Courier New" panose="02070309020205020404" pitchFamily="49" charset="0"/>
+                <a:cs typeface="Courier New" panose="02070309020205020404" pitchFamily="49" charset="0"/>
+              </a:rPr>
+              <a:t>a:lastline</a:t>
+            </a:r>
+            <a:r>
+              <a:rPr lang="en-US" dirty="0">
+                <a:latin typeface="+mn-lt"/>
+                <a:cs typeface="Courier New" panose="02070309020205020404" pitchFamily="49" charset="0"/>
+              </a:rPr>
+              <a:t> are the built in </a:t>
+            </a:r>
+            <a:r>
+              <a:rPr lang="en-US" dirty="0" err="1">
+                <a:latin typeface="+mn-lt"/>
+                <a:cs typeface="Courier New" panose="02070309020205020404" pitchFamily="49" charset="0"/>
+              </a:rPr>
+              <a:t>args</a:t>
+            </a:r>
+            <a:r>
+              <a:rPr lang="en-US" dirty="0">
+                <a:latin typeface="+mn-lt"/>
+                <a:cs typeface="Courier New" panose="02070309020205020404" pitchFamily="49" charset="0"/>
+              </a:rPr>
+              <a:t> that will have 10 and 20 respectively</a:t>
+            </a:r>
+            <a:endParaRPr lang="en-US" dirty="0">
+              <a:latin typeface="Courier New" panose="02070309020205020404" pitchFamily="49" charset="0"/>
+              <a:cs typeface="Courier New" panose="02070309020205020404" pitchFamily="49" charset="0"/>
+            </a:endParaRPr>
+          </a:p>
+          <a:p>
+            <a:endParaRPr lang="en-US" dirty="0"/>
+          </a:p>
+        </p:txBody>
+      </p:sp>
+      <p:sp>
+        <p:nvSpPr>
+          <p:cNvPr id="4" name="Content Placeholder 2">
+            <a:extLst>
+              <a:ext uri="{FF2B5EF4-FFF2-40B4-BE49-F238E27FC236}">
+                <a16:creationId xmlns:a16="http://schemas.microsoft.com/office/drawing/2014/main" id="{B25B0F9A-13E8-A2C6-0391-753D88DD59A3}"/>
+              </a:ext>
+            </a:extLst>
+          </p:cNvPr>
+          <p:cNvSpPr txBox="1">
+            <a:spLocks/>
+          </p:cNvSpPr>
+          <p:nvPr/>
+        </p:nvSpPr>
+        <p:spPr bwMode="auto">
+          <a:xfrm>
+            <a:off x="5975130" y="1237594"/>
+            <a:ext cx="6216871" cy="5052847"/>
+          </a:xfrm>
+          <a:prstGeom prst="rect">
+            <a:avLst/>
+          </a:prstGeom>
+          <a:noFill/>
+          <a:ln w="9525">
+            <a:solidFill>
+              <a:schemeClr val="accent1"/>
+            </a:solidFill>
+            <a:miter lim="800000"/>
+            <a:headEnd/>
+            <a:tailEnd/>
+          </a:ln>
+        </p:spPr>
+        <p:txBody>
+          <a:bodyPr vert="horz" wrap="square" lIns="91440" tIns="45720" rIns="91440" bIns="45720" numCol="1" anchor="t" anchorCtr="0" compatLnSpc="1">
+            <a:prstTxWarp prst="textNoShape">
+              <a:avLst/>
+            </a:prstTxWarp>
+            <a:noAutofit/>
+          </a:bodyPr>
+          <a:lstStyle>
+            <a:lvl1pPr marL="288925" indent="-288925" algn="l" rtl="0" eaLnBrk="1" fontAlgn="base" hangingPunct="1">
+              <a:lnSpc>
+                <a:spcPct val="90000"/>
+              </a:lnSpc>
+              <a:spcBef>
+                <a:spcPts val="1800"/>
+              </a:spcBef>
+              <a:spcAft>
+                <a:spcPct val="0"/>
+              </a:spcAft>
+              <a:buClr>
+                <a:schemeClr val="tx1"/>
+              </a:buClr>
+              <a:buSzPct val="90000"/>
+              <a:buFont typeface="Century Gothic" panose="020B0502020202020204" pitchFamily="34" charset="0"/>
+              <a:buChar char="•"/>
+              <a:defRPr lang="en-US" sz="2800" kern="1200" dirty="0">
+                <a:solidFill>
+                  <a:schemeClr val="tx1"/>
+                </a:solidFill>
+                <a:latin typeface="Century Gothic" panose="020B0502020202020204" pitchFamily="34" charset="0"/>
+                <a:ea typeface="+mn-ea"/>
+                <a:cs typeface="+mn-cs"/>
+              </a:defRPr>
+            </a:lvl1pPr>
+            <a:lvl2pPr marL="687388" indent="-288925" algn="l" rtl="0" eaLnBrk="1" fontAlgn="base" hangingPunct="1">
+              <a:lnSpc>
+                <a:spcPct val="90000"/>
+              </a:lnSpc>
+              <a:spcBef>
+                <a:spcPts val="800"/>
+              </a:spcBef>
+              <a:spcAft>
+                <a:spcPct val="0"/>
+              </a:spcAft>
+              <a:buClr>
+                <a:schemeClr val="tx1"/>
+              </a:buClr>
+              <a:buSzPct val="90000"/>
+              <a:buFont typeface="Century Gothic" panose="020B0502020202020204" pitchFamily="34" charset="0"/>
+              <a:buChar char="–"/>
+              <a:defRPr sz="2400" kern="1200">
+                <a:solidFill>
+                  <a:schemeClr val="tx1"/>
+                </a:solidFill>
+                <a:latin typeface="+mn-lt"/>
+                <a:ea typeface="+mn-ea"/>
+                <a:cs typeface="Arial" panose="020B0604020202020204" pitchFamily="34" charset="0"/>
+              </a:defRPr>
+            </a:lvl2pPr>
+            <a:lvl3pPr marL="1031875" indent="-288925" algn="l" rtl="0" eaLnBrk="1" fontAlgn="base" hangingPunct="1">
+              <a:lnSpc>
+                <a:spcPct val="90000"/>
+              </a:lnSpc>
+              <a:spcBef>
+                <a:spcPts val="800"/>
+              </a:spcBef>
+              <a:spcAft>
+                <a:spcPct val="0"/>
+              </a:spcAft>
+              <a:buClr>
+                <a:schemeClr val="tx1"/>
+              </a:buClr>
+              <a:buSzPct val="90000"/>
+              <a:buFont typeface="Century Gothic" panose="020B0502020202020204" pitchFamily="34" charset="0"/>
+              <a:buChar char="•"/>
+              <a:defRPr sz="2000" kern="1200">
+                <a:solidFill>
+                  <a:schemeClr val="tx1"/>
+                </a:solidFill>
+                <a:latin typeface="+mn-lt"/>
+                <a:ea typeface="+mn-ea"/>
+                <a:cs typeface="Arial" panose="020B0604020202020204" pitchFamily="34" charset="0"/>
+              </a:defRPr>
+            </a:lvl3pPr>
+            <a:lvl4pPr marL="1144588" indent="-173038" algn="l" rtl="0" eaLnBrk="1" fontAlgn="base" hangingPunct="1">
+              <a:lnSpc>
+                <a:spcPct val="90000"/>
+              </a:lnSpc>
+              <a:spcBef>
+                <a:spcPts val="800"/>
+              </a:spcBef>
+              <a:spcAft>
+                <a:spcPct val="0"/>
+              </a:spcAft>
+              <a:buClr>
+                <a:schemeClr val="tx1"/>
+              </a:buClr>
+              <a:buFont typeface="Arial" charset="0"/>
+              <a:buChar char="–"/>
+              <a:defRPr sz="1800" kern="1200">
+                <a:solidFill>
+                  <a:schemeClr val="tx1"/>
+                </a:solidFill>
+                <a:latin typeface="+mn-lt"/>
+                <a:ea typeface="+mn-ea"/>
+                <a:cs typeface="Arial" panose="020B0604020202020204" pitchFamily="34" charset="0"/>
+              </a:defRPr>
+            </a:lvl4pPr>
+            <a:lvl5pPr marL="1482725" indent="-222250" algn="l" rtl="0" eaLnBrk="1" fontAlgn="base" hangingPunct="1">
+              <a:lnSpc>
+                <a:spcPct val="90000"/>
+              </a:lnSpc>
+              <a:spcBef>
+                <a:spcPts val="600"/>
+              </a:spcBef>
+              <a:spcAft>
+                <a:spcPct val="0"/>
+              </a:spcAft>
+              <a:buClr>
+                <a:schemeClr val="tx1"/>
+              </a:buClr>
+              <a:buFont typeface="Arial" panose="020B0604020202020204" pitchFamily="34" charset="0"/>
+              <a:buChar char="•"/>
+              <a:defRPr sz="1800" kern="1200">
+                <a:solidFill>
+                  <a:schemeClr val="tx1"/>
+                </a:solidFill>
+                <a:latin typeface="+mn-lt"/>
+                <a:ea typeface="+mn-ea"/>
+                <a:cs typeface="Arial" panose="020B0604020202020204" pitchFamily="34" charset="0"/>
+              </a:defRPr>
+            </a:lvl5pPr>
+            <a:lvl6pPr marL="2514600" indent="-228600" algn="l" defTabSz="914400" rtl="0" eaLnBrk="1" latinLnBrk="0" hangingPunct="1">
+              <a:spcBef>
+                <a:spcPct val="20000"/>
+              </a:spcBef>
+              <a:buFont typeface="Arial" pitchFamily="34" charset="0"/>
+              <a:buChar char="•"/>
+              <a:defRPr sz="2000" kern="1200">
+                <a:solidFill>
+                  <a:schemeClr val="tx1"/>
+                </a:solidFill>
+                <a:latin typeface="+mn-lt"/>
+                <a:ea typeface="+mn-ea"/>
+                <a:cs typeface="+mn-cs"/>
+              </a:defRPr>
+            </a:lvl6pPr>
+            <a:lvl7pPr marL="2971800" indent="-228600" algn="l" defTabSz="914400" rtl="0" eaLnBrk="1" latinLnBrk="0" hangingPunct="1">
+              <a:spcBef>
+                <a:spcPct val="20000"/>
+              </a:spcBef>
+              <a:buFont typeface="Arial" pitchFamily="34" charset="0"/>
+              <a:buChar char="•"/>
+              <a:defRPr sz="2000" kern="1200">
+                <a:solidFill>
+                  <a:schemeClr val="tx1"/>
+                </a:solidFill>
+                <a:latin typeface="+mn-lt"/>
+                <a:ea typeface="+mn-ea"/>
+                <a:cs typeface="+mn-cs"/>
+              </a:defRPr>
+            </a:lvl7pPr>
+            <a:lvl8pPr marL="3429000" indent="-228600" algn="l" defTabSz="914400" rtl="0" eaLnBrk="1" latinLnBrk="0" hangingPunct="1">
+              <a:spcBef>
+                <a:spcPct val="20000"/>
+              </a:spcBef>
+              <a:buFont typeface="Arial" pitchFamily="34" charset="0"/>
+              <a:buChar char="•"/>
+              <a:defRPr sz="2000" kern="1200">
+                <a:solidFill>
+                  <a:schemeClr val="tx1"/>
+                </a:solidFill>
+                <a:latin typeface="+mn-lt"/>
+                <a:ea typeface="+mn-ea"/>
+                <a:cs typeface="+mn-cs"/>
+              </a:defRPr>
+            </a:lvl8pPr>
+            <a:lvl9pPr marL="3886200" indent="-228600" algn="l" defTabSz="914400" rtl="0" eaLnBrk="1" latinLnBrk="0" hangingPunct="1">
+              <a:spcBef>
+                <a:spcPct val="20000"/>
+              </a:spcBef>
+              <a:buFont typeface="Arial" pitchFamily="34" charset="0"/>
+              <a:buChar char="•"/>
+              <a:defRPr sz="2000" kern="1200">
+                <a:solidFill>
+                  <a:schemeClr val="tx1"/>
+                </a:solidFill>
+                <a:latin typeface="+mn-lt"/>
+                <a:ea typeface="+mn-ea"/>
+                <a:cs typeface="+mn-cs"/>
+              </a:defRPr>
+            </a:lvl9pPr>
+          </a:lstStyle>
+          <a:p>
+            <a:pPr marL="0" indent="0">
+              <a:buNone/>
+            </a:pPr>
+            <a:r>
+              <a:rPr lang="en-US" sz="2000" dirty="0">
+                <a:latin typeface="Courier New" panose="02070309020205020404" pitchFamily="49" charset="0"/>
+                <a:cs typeface="Courier New" panose="02070309020205020404" pitchFamily="49" charset="0"/>
+              </a:rPr>
+              <a:t>“discontinue running at first error</a:t>
+            </a:r>
+            <a:br>
+              <a:rPr lang="en-US" sz="2000" dirty="0">
+                <a:latin typeface="Courier New" panose="02070309020205020404" pitchFamily="49" charset="0"/>
+                <a:cs typeface="Courier New" panose="02070309020205020404" pitchFamily="49" charset="0"/>
+              </a:rPr>
+            </a:br>
+            <a:r>
+              <a:rPr lang="en-US" sz="2000" dirty="0">
+                <a:latin typeface="Courier New" panose="02070309020205020404" pitchFamily="49" charset="0"/>
+                <a:cs typeface="Courier New" panose="02070309020205020404" pitchFamily="49" charset="0"/>
+              </a:rPr>
+              <a:t>function </a:t>
+            </a:r>
+            <a:r>
+              <a:rPr lang="en-US" sz="2000" dirty="0" err="1">
+                <a:latin typeface="Courier New" panose="02070309020205020404" pitchFamily="49" charset="0"/>
+                <a:cs typeface="Courier New" panose="02070309020205020404" pitchFamily="49" charset="0"/>
+              </a:rPr>
+              <a:t>Procdata</a:t>
+            </a:r>
+            <a:r>
+              <a:rPr lang="en-US" sz="2000" dirty="0">
+                <a:latin typeface="Courier New" panose="02070309020205020404" pitchFamily="49" charset="0"/>
+                <a:cs typeface="Courier New" panose="02070309020205020404" pitchFamily="49" charset="0"/>
+              </a:rPr>
+              <a:t>(“</a:t>
+            </a:r>
+            <a:r>
+              <a:rPr lang="en-US" sz="2000" dirty="0" err="1">
+                <a:latin typeface="Courier New" panose="02070309020205020404" pitchFamily="49" charset="0"/>
+                <a:cs typeface="Courier New" panose="02070309020205020404" pitchFamily="49" charset="0"/>
+              </a:rPr>
+              <a:t>data.json</a:t>
+            </a:r>
+            <a:r>
+              <a:rPr lang="en-US" sz="2000" dirty="0">
+                <a:latin typeface="Courier New" panose="02070309020205020404" pitchFamily="49" charset="0"/>
+                <a:cs typeface="Courier New" panose="02070309020205020404" pitchFamily="49" charset="0"/>
+              </a:rPr>
+              <a:t>”) </a:t>
+            </a:r>
+            <a:r>
+              <a:rPr lang="en-US" sz="2000" b="1" dirty="0">
+                <a:latin typeface="Courier New" panose="02070309020205020404" pitchFamily="49" charset="0"/>
+                <a:cs typeface="Courier New" panose="02070309020205020404" pitchFamily="49" charset="0"/>
+              </a:rPr>
+              <a:t>abort</a:t>
+            </a:r>
+            <a:br>
+              <a:rPr lang="en-US" sz="2000" dirty="0">
+                <a:latin typeface="Courier New" panose="02070309020205020404" pitchFamily="49" charset="0"/>
+                <a:cs typeface="Courier New" panose="02070309020205020404" pitchFamily="49" charset="0"/>
+              </a:rPr>
+            </a:br>
+            <a:r>
+              <a:rPr lang="en-US" sz="2000" dirty="0">
+                <a:latin typeface="Courier New" panose="02070309020205020404" pitchFamily="49" charset="0"/>
+                <a:cs typeface="Courier New" panose="02070309020205020404" pitchFamily="49" charset="0"/>
+              </a:rPr>
+              <a:t>.</a:t>
+            </a:r>
+            <a:br>
+              <a:rPr lang="en-US" sz="2000" dirty="0">
+                <a:latin typeface="Courier New" panose="02070309020205020404" pitchFamily="49" charset="0"/>
+                <a:cs typeface="Courier New" panose="02070309020205020404" pitchFamily="49" charset="0"/>
+              </a:rPr>
+            </a:br>
+            <a:r>
+              <a:rPr lang="en-US" sz="2000" dirty="0">
+                <a:latin typeface="Courier New" panose="02070309020205020404" pitchFamily="49" charset="0"/>
+                <a:cs typeface="Courier New" panose="02070309020205020404" pitchFamily="49" charset="0"/>
+              </a:rPr>
+              <a:t>.</a:t>
+            </a:r>
+            <a:br>
+              <a:rPr lang="en-US" sz="2000" dirty="0">
+                <a:latin typeface="Courier New" panose="02070309020205020404" pitchFamily="49" charset="0"/>
+                <a:cs typeface="Courier New" panose="02070309020205020404" pitchFamily="49" charset="0"/>
+              </a:rPr>
+            </a:br>
+            <a:r>
+              <a:rPr lang="en-US" sz="2000" dirty="0" err="1">
+                <a:latin typeface="Courier New" panose="02070309020205020404" pitchFamily="49" charset="0"/>
+                <a:cs typeface="Courier New" panose="02070309020205020404" pitchFamily="49" charset="0"/>
+              </a:rPr>
+              <a:t>endfunction</a:t>
+            </a:r>
+            <a:br>
+              <a:rPr lang="en-US" sz="2000" dirty="0">
+                <a:latin typeface="Courier New" panose="02070309020205020404" pitchFamily="49" charset="0"/>
+                <a:cs typeface="Courier New" panose="02070309020205020404" pitchFamily="49" charset="0"/>
+              </a:rPr>
+            </a:br>
+            <a:br>
+              <a:rPr lang="en-US" sz="2000" dirty="0">
+                <a:latin typeface="Courier New" panose="02070309020205020404" pitchFamily="49" charset="0"/>
+                <a:cs typeface="Courier New" panose="02070309020205020404" pitchFamily="49" charset="0"/>
+              </a:rPr>
+            </a:br>
+            <a:r>
+              <a:rPr lang="en-US" sz="2000" dirty="0">
+                <a:latin typeface="Courier New" panose="02070309020205020404" pitchFamily="49" charset="0"/>
+                <a:cs typeface="Courier New" panose="02070309020205020404" pitchFamily="49" charset="0"/>
+              </a:rPr>
+              <a:t>function </a:t>
+            </a:r>
+            <a:r>
+              <a:rPr lang="en-US" sz="2000" dirty="0" err="1">
+                <a:latin typeface="Courier New" panose="02070309020205020404" pitchFamily="49" charset="0"/>
+                <a:cs typeface="Courier New" panose="02070309020205020404" pitchFamily="49" charset="0"/>
+              </a:rPr>
+              <a:t>Countwords</a:t>
+            </a:r>
+            <a:r>
+              <a:rPr lang="en-US" sz="2000" dirty="0">
+                <a:latin typeface="Courier New" panose="02070309020205020404" pitchFamily="49" charset="0"/>
+                <a:cs typeface="Courier New" panose="02070309020205020404" pitchFamily="49" charset="0"/>
+              </a:rPr>
+              <a:t>() </a:t>
+            </a:r>
+            <a:r>
+              <a:rPr lang="en-US" sz="2000" b="1" dirty="0">
+                <a:latin typeface="Courier New" panose="02070309020205020404" pitchFamily="49" charset="0"/>
+                <a:cs typeface="Courier New" panose="02070309020205020404" pitchFamily="49" charset="0"/>
+              </a:rPr>
+              <a:t>range</a:t>
+            </a:r>
+            <a:br>
+              <a:rPr lang="en-US" sz="2000" dirty="0">
+                <a:latin typeface="Courier New" panose="02070309020205020404" pitchFamily="49" charset="0"/>
+                <a:cs typeface="Courier New" panose="02070309020205020404" pitchFamily="49" charset="0"/>
+              </a:rPr>
+            </a:br>
+            <a:r>
+              <a:rPr lang="en-US" sz="2000" dirty="0">
+                <a:latin typeface="Courier New" panose="02070309020205020404" pitchFamily="49" charset="0"/>
+                <a:cs typeface="Courier New" panose="02070309020205020404" pitchFamily="49" charset="0"/>
+              </a:rPr>
+              <a:t>  let </a:t>
+            </a:r>
+            <a:r>
+              <a:rPr lang="en-US" sz="2000" dirty="0" err="1">
+                <a:latin typeface="Courier New" panose="02070309020205020404" pitchFamily="49" charset="0"/>
+                <a:cs typeface="Courier New" panose="02070309020205020404" pitchFamily="49" charset="0"/>
+              </a:rPr>
+              <a:t>lnum</a:t>
+            </a:r>
+            <a:r>
+              <a:rPr lang="en-US" sz="2000" dirty="0">
+                <a:latin typeface="Courier New" panose="02070309020205020404" pitchFamily="49" charset="0"/>
+                <a:cs typeface="Courier New" panose="02070309020205020404" pitchFamily="49" charset="0"/>
+              </a:rPr>
+              <a:t> = </a:t>
+            </a:r>
+            <a:r>
+              <a:rPr lang="en-US" sz="2000" dirty="0" err="1">
+                <a:latin typeface="Courier New" panose="02070309020205020404" pitchFamily="49" charset="0"/>
+                <a:cs typeface="Courier New" panose="02070309020205020404" pitchFamily="49" charset="0"/>
+              </a:rPr>
+              <a:t>a:firstline</a:t>
+            </a:r>
+            <a:br>
+              <a:rPr lang="en-US" sz="2000" dirty="0">
+                <a:latin typeface="Courier New" panose="02070309020205020404" pitchFamily="49" charset="0"/>
+                <a:cs typeface="Courier New" panose="02070309020205020404" pitchFamily="49" charset="0"/>
+              </a:rPr>
+            </a:br>
+            <a:r>
+              <a:rPr lang="en-US" sz="2000" dirty="0">
+                <a:latin typeface="Courier New" panose="02070309020205020404" pitchFamily="49" charset="0"/>
+                <a:cs typeface="Courier New" panose="02070309020205020404" pitchFamily="49" charset="0"/>
+              </a:rPr>
+              <a:t>  let n = 0  </a:t>
+            </a:r>
+            <a:br>
+              <a:rPr lang="en-US" sz="2000" dirty="0">
+                <a:latin typeface="Courier New" panose="02070309020205020404" pitchFamily="49" charset="0"/>
+                <a:cs typeface="Courier New" panose="02070309020205020404" pitchFamily="49" charset="0"/>
+              </a:rPr>
+            </a:br>
+            <a:r>
+              <a:rPr lang="en-US" sz="2000" dirty="0">
+                <a:latin typeface="Courier New" panose="02070309020205020404" pitchFamily="49" charset="0"/>
+                <a:cs typeface="Courier New" panose="02070309020205020404" pitchFamily="49" charset="0"/>
+              </a:rPr>
+              <a:t>  while </a:t>
+            </a:r>
+            <a:r>
+              <a:rPr lang="en-US" sz="2000" dirty="0" err="1">
+                <a:latin typeface="Courier New" panose="02070309020205020404" pitchFamily="49" charset="0"/>
+                <a:cs typeface="Courier New" panose="02070309020205020404" pitchFamily="49" charset="0"/>
+              </a:rPr>
+              <a:t>lnum</a:t>
+            </a:r>
+            <a:r>
+              <a:rPr lang="en-US" sz="2000" dirty="0">
+                <a:latin typeface="Courier New" panose="02070309020205020404" pitchFamily="49" charset="0"/>
+                <a:cs typeface="Courier New" panose="02070309020205020404" pitchFamily="49" charset="0"/>
+              </a:rPr>
+              <a:t> &lt;= </a:t>
+            </a:r>
+            <a:r>
+              <a:rPr lang="en-US" sz="2000" dirty="0" err="1">
+                <a:latin typeface="Courier New" panose="02070309020205020404" pitchFamily="49" charset="0"/>
+                <a:cs typeface="Courier New" panose="02070309020205020404" pitchFamily="49" charset="0"/>
+              </a:rPr>
+              <a:t>a:lastline</a:t>
+            </a:r>
+            <a:br>
+              <a:rPr lang="en-US" sz="2000" dirty="0">
+                <a:latin typeface="Courier New" panose="02070309020205020404" pitchFamily="49" charset="0"/>
+                <a:cs typeface="Courier New" panose="02070309020205020404" pitchFamily="49" charset="0"/>
+              </a:rPr>
+            </a:br>
+            <a:r>
+              <a:rPr lang="en-US" sz="2000" dirty="0">
+                <a:latin typeface="Courier New" panose="02070309020205020404" pitchFamily="49" charset="0"/>
+                <a:cs typeface="Courier New" panose="02070309020205020404" pitchFamily="49" charset="0"/>
+              </a:rPr>
+              <a:t>    let n += </a:t>
+            </a:r>
+            <a:r>
+              <a:rPr lang="en-US" sz="2000" dirty="0" err="1">
+                <a:latin typeface="Courier New" panose="02070309020205020404" pitchFamily="49" charset="0"/>
+                <a:cs typeface="Courier New" panose="02070309020205020404" pitchFamily="49" charset="0"/>
+              </a:rPr>
+              <a:t>len</a:t>
+            </a:r>
+            <a:r>
+              <a:rPr lang="en-US" sz="2000" dirty="0">
+                <a:latin typeface="Courier New" panose="02070309020205020404" pitchFamily="49" charset="0"/>
+                <a:cs typeface="Courier New" panose="02070309020205020404" pitchFamily="49" charset="0"/>
+              </a:rPr>
+              <a:t>(split(</a:t>
+            </a:r>
+            <a:r>
+              <a:rPr lang="en-US" sz="2000" dirty="0" err="1">
+                <a:latin typeface="Courier New" panose="02070309020205020404" pitchFamily="49" charset="0"/>
+                <a:cs typeface="Courier New" panose="02070309020205020404" pitchFamily="49" charset="0"/>
+              </a:rPr>
+              <a:t>getline</a:t>
+            </a:r>
+            <a:r>
+              <a:rPr lang="en-US" sz="2000" dirty="0">
+                <a:latin typeface="Courier New" panose="02070309020205020404" pitchFamily="49" charset="0"/>
+                <a:cs typeface="Courier New" panose="02070309020205020404" pitchFamily="49" charset="0"/>
+              </a:rPr>
+              <a:t>(</a:t>
+            </a:r>
+            <a:r>
+              <a:rPr lang="en-US" sz="2000" dirty="0" err="1">
+                <a:latin typeface="Courier New" panose="02070309020205020404" pitchFamily="49" charset="0"/>
+                <a:cs typeface="Courier New" panose="02070309020205020404" pitchFamily="49" charset="0"/>
+              </a:rPr>
+              <a:t>lnum</a:t>
+            </a:r>
+            <a:r>
+              <a:rPr lang="en-US" sz="2000" dirty="0">
+                <a:latin typeface="Courier New" panose="02070309020205020404" pitchFamily="49" charset="0"/>
+                <a:cs typeface="Courier New" panose="02070309020205020404" pitchFamily="49" charset="0"/>
+              </a:rPr>
+              <a:t>)))</a:t>
+            </a:r>
+            <a:br>
+              <a:rPr lang="en-US" sz="2000" dirty="0">
+                <a:latin typeface="Courier New" panose="02070309020205020404" pitchFamily="49" charset="0"/>
+                <a:cs typeface="Courier New" panose="02070309020205020404" pitchFamily="49" charset="0"/>
+              </a:rPr>
+            </a:br>
+            <a:r>
+              <a:rPr lang="en-US" sz="2000" dirty="0">
+                <a:latin typeface="Courier New" panose="02070309020205020404" pitchFamily="49" charset="0"/>
+                <a:cs typeface="Courier New" panose="02070309020205020404" pitchFamily="49" charset="0"/>
+              </a:rPr>
+              <a:t>    </a:t>
+            </a:r>
+            <a:r>
+              <a:rPr lang="en-US" sz="2000" dirty="0" err="1">
+                <a:latin typeface="Courier New" panose="02070309020205020404" pitchFamily="49" charset="0"/>
+                <a:cs typeface="Courier New" panose="02070309020205020404" pitchFamily="49" charset="0"/>
+              </a:rPr>
+              <a:t>lnum</a:t>
+            </a:r>
+            <a:r>
+              <a:rPr lang="en-US" sz="2000" dirty="0">
+                <a:latin typeface="Courier New" panose="02070309020205020404" pitchFamily="49" charset="0"/>
+                <a:cs typeface="Courier New" panose="02070309020205020404" pitchFamily="49" charset="0"/>
+              </a:rPr>
+              <a:t> += 1</a:t>
+            </a:r>
+            <a:br>
+              <a:rPr lang="en-US" sz="2000" dirty="0">
+                <a:latin typeface="Courier New" panose="02070309020205020404" pitchFamily="49" charset="0"/>
+                <a:cs typeface="Courier New" panose="02070309020205020404" pitchFamily="49" charset="0"/>
+              </a:rPr>
+            </a:br>
+            <a:r>
+              <a:rPr lang="en-US" sz="2000" dirty="0">
+                <a:latin typeface="Courier New" panose="02070309020205020404" pitchFamily="49" charset="0"/>
+                <a:cs typeface="Courier New" panose="02070309020205020404" pitchFamily="49" charset="0"/>
+              </a:rPr>
+              <a:t>  </a:t>
+            </a:r>
+            <a:r>
+              <a:rPr lang="en-US" sz="2000" dirty="0" err="1">
+                <a:latin typeface="Courier New" panose="02070309020205020404" pitchFamily="49" charset="0"/>
+                <a:cs typeface="Courier New" panose="02070309020205020404" pitchFamily="49" charset="0"/>
+              </a:rPr>
+              <a:t>endwhile</a:t>
+            </a:r>
+            <a:br>
+              <a:rPr lang="en-US" sz="2000" dirty="0">
+                <a:latin typeface="Courier New" panose="02070309020205020404" pitchFamily="49" charset="0"/>
+                <a:cs typeface="Courier New" panose="02070309020205020404" pitchFamily="49" charset="0"/>
+              </a:rPr>
+            </a:br>
+            <a:r>
+              <a:rPr lang="en-US" sz="2000" dirty="0">
+                <a:latin typeface="Courier New" panose="02070309020205020404" pitchFamily="49" charset="0"/>
+                <a:cs typeface="Courier New" panose="02070309020205020404" pitchFamily="49" charset="0"/>
+              </a:rPr>
+              <a:t>  echo “found “.n.” words.”</a:t>
+            </a:r>
+            <a:br>
+              <a:rPr lang="en-US" sz="2000" dirty="0">
+                <a:latin typeface="Courier New" panose="02070309020205020404" pitchFamily="49" charset="0"/>
+                <a:cs typeface="Courier New" panose="02070309020205020404" pitchFamily="49" charset="0"/>
+              </a:rPr>
+            </a:br>
+            <a:r>
+              <a:rPr lang="en-US" sz="2000" dirty="0" err="1">
+                <a:latin typeface="Courier New" panose="02070309020205020404" pitchFamily="49" charset="0"/>
+                <a:cs typeface="Courier New" panose="02070309020205020404" pitchFamily="49" charset="0"/>
+              </a:rPr>
+              <a:t>endfunction</a:t>
+            </a:r>
+            <a:endParaRPr lang="en-US" sz="2000" dirty="0">
+              <a:latin typeface="Courier New" panose="02070309020205020404" pitchFamily="49" charset="0"/>
+              <a:cs typeface="Courier New" panose="02070309020205020404" pitchFamily="49" charset="0"/>
+            </a:endParaRPr>
+          </a:p>
+        </p:txBody>
+      </p:sp>
+    </p:spTree>
+    <p:extLst>
+      <p:ext uri="{BB962C8B-B14F-4D97-AF65-F5344CB8AC3E}">
+        <p14:creationId xmlns:p14="http://schemas.microsoft.com/office/powerpoint/2010/main" val="2251916571"/>
+      </p:ext>
+    </p:extLst>
+  </p:cSld>
+  <p:clrMapOvr>
+    <a:masterClrMapping/>
+  </p:clrMapOvr>
+</p:sld>
+</file>
+
+<file path=ppt/slides/slide21.xml><?xml version="1.0" encoding="utf-8"?>
 <p:sld xmlns:a="http://schemas.openxmlformats.org/drawingml/2006/main" xmlns:r="http://schemas.openxmlformats.org/officeDocument/2006/relationships" xmlns:p="http://schemas.openxmlformats.org/presentationml/2006/main">
   <p:cSld>
     <p:spTree>
@@ -17971,7 +19339,7 @@
           <a:bodyPr/>
           <a:lstStyle/>
           <a:p>
-            <a:endParaRPr lang="en-US"/>
+            <a:endParaRPr lang="en-US" dirty="0"/>
           </a:p>
         </p:txBody>
       </p:sp>
@@ -17988,7 +19356,7 @@
 </p:sld>
 </file>
 
-<file path=ppt/slides/slide21.xml><?xml version="1.0" encoding="utf-8"?>
+<file path=ppt/slides/slide22.xml><?xml version="1.0" encoding="utf-8"?>
 <p:sld xmlns:a="http://schemas.openxmlformats.org/drawingml/2006/main" xmlns:r="http://schemas.openxmlformats.org/officeDocument/2006/relationships" xmlns:p="http://schemas.openxmlformats.org/presentationml/2006/main">
   <p:cSld>
     <p:spTree>
@@ -18075,7 +19443,7 @@
 </p:sld>
 </file>
 
-<file path=ppt/slides/slide22.xml><?xml version="1.0" encoding="utf-8"?>
+<file path=ppt/slides/slide23.xml><?xml version="1.0" encoding="utf-8"?>
 <p:sld xmlns:a="http://schemas.openxmlformats.org/drawingml/2006/main" xmlns:r="http://schemas.openxmlformats.org/officeDocument/2006/relationships" xmlns:p="http://schemas.openxmlformats.org/presentationml/2006/main">
   <p:cSld>
     <p:spTree>
@@ -18138,8 +19506,8 @@
         </p:nvSpPr>
         <p:spPr>
           <a:xfrm>
-            <a:off x="448055" y="1653735"/>
-            <a:ext cx="5647945" cy="4047778"/>
+            <a:off x="448055" y="1653734"/>
+            <a:ext cx="5647945" cy="4411003"/>
           </a:xfrm>
         </p:spPr>
         <p:txBody>
@@ -18161,11 +19529,46 @@
                 <a:latin typeface="Courier New" panose="02070309020205020404" pitchFamily="49" charset="0"/>
                 <a:cs typeface="Courier New" panose="02070309020205020404" pitchFamily="49" charset="0"/>
               </a:rPr>
-              <a:t>unlet</a:t>
+              <a:t>unlet var</a:t>
             </a:r>
             <a:r>
               <a:rPr lang="en-US" dirty="0"/>
-              <a:t> to delete defined variables</a:t>
+              <a:t> to delete defined variables, </a:t>
+            </a:r>
+            <a:r>
+              <a:rPr lang="en-US" dirty="0" err="1">
+                <a:latin typeface="Courier New" panose="02070309020205020404" pitchFamily="49" charset="0"/>
+                <a:cs typeface="Courier New" panose="02070309020205020404" pitchFamily="49" charset="0"/>
+              </a:rPr>
+              <a:t>delfunction</a:t>
+            </a:r>
+            <a:r>
+              <a:rPr lang="en-US" dirty="0">
+                <a:latin typeface="Courier New" panose="02070309020205020404" pitchFamily="49" charset="0"/>
+                <a:cs typeface="Courier New" panose="02070309020205020404" pitchFamily="49" charset="0"/>
+              </a:rPr>
+              <a:t> </a:t>
+            </a:r>
+            <a:r>
+              <a:rPr lang="en-US" dirty="0" err="1">
+                <a:latin typeface="Courier New" panose="02070309020205020404" pitchFamily="49" charset="0"/>
+                <a:cs typeface="Courier New" panose="02070309020205020404" pitchFamily="49" charset="0"/>
+              </a:rPr>
+              <a:t>Fname</a:t>
+            </a:r>
+            <a:r>
+              <a:rPr lang="en-US" dirty="0">
+                <a:latin typeface="Courier New" panose="02070309020205020404" pitchFamily="49" charset="0"/>
+                <a:cs typeface="Courier New" panose="02070309020205020404" pitchFamily="49" charset="0"/>
+              </a:rPr>
+              <a:t> </a:t>
+            </a:r>
+            <a:r>
+              <a:rPr lang="en-US" dirty="0">
+                <a:latin typeface="+mn-lt"/>
+                <a:cs typeface="Courier New" panose="02070309020205020404" pitchFamily="49" charset="0"/>
+              </a:rPr>
+              <a:t>to delete functions</a:t>
             </a:r>
           </a:p>
           <a:p>
@@ -18409,7 +19812,7 @@
                 <a:latin typeface="Courier New" panose="02070309020205020404" pitchFamily="49" charset="0"/>
                 <a:cs typeface="Courier New" panose="02070309020205020404" pitchFamily="49" charset="0"/>
               </a:rPr>
-              <a:t>“valid code</a:t>
+              <a:t>“ This is valid code</a:t>
             </a:r>
             <a:br>
               <a:rPr lang="en-US" sz="2000" dirty="0">
@@ -18682,19 +20085,8 @@
                 <a:latin typeface="Courier New" panose="02070309020205020404" pitchFamily="49" charset="0"/>
                 <a:cs typeface="Courier New" panose="02070309020205020404" pitchFamily="49" charset="0"/>
               </a:rPr>
-              <a:t>echo @r |”contents </a:t>
-            </a:r>
-            <a:r>
-              <a:rPr lang="en-US" sz="2000">
-                <a:latin typeface="Courier New" panose="02070309020205020404" pitchFamily="49" charset="0"/>
-                <a:cs typeface="Courier New" panose="02070309020205020404" pitchFamily="49" charset="0"/>
-              </a:rPr>
-              <a:t>of register r</a:t>
-            </a:r>
-            <a:endParaRPr lang="en-US" sz="2000" dirty="0">
-              <a:latin typeface="Courier New" panose="02070309020205020404" pitchFamily="49" charset="0"/>
-              <a:cs typeface="Courier New" panose="02070309020205020404" pitchFamily="49" charset="0"/>
-            </a:endParaRPr>
+              <a:t>echo @r |”contents of register r</a:t>
+            </a:r>
           </a:p>
           <a:p>
             <a:pPr marL="0" indent="0">
@@ -18730,8 +20122,8 @@
 </p:sld>
 </file>
 
-<file path=ppt/slides/slide23.xml><?xml version="1.0" encoding="utf-8"?>
-<p:sld xmlns:a="http://schemas.openxmlformats.org/drawingml/2006/main" xmlns:r="http://schemas.openxmlformats.org/officeDocument/2006/relationships" xmlns:p="http://schemas.openxmlformats.org/presentationml/2006/main" show="0">
+<file path=ppt/slides/slide24.xml><?xml version="1.0" encoding="utf-8"?>
+<p:sld xmlns:a="http://schemas.openxmlformats.org/drawingml/2006/main" xmlns:r="http://schemas.openxmlformats.org/officeDocument/2006/relationships" xmlns:p="http://schemas.openxmlformats.org/presentationml/2006/main">
   <p:cSld>
     <p:spTree>
       <p:nvGrpSpPr>
@@ -18752,7 +20144,7 @@
           <p:cNvPr id="2" name="Title 1">
             <a:extLst>
               <a:ext uri="{FF2B5EF4-FFF2-40B4-BE49-F238E27FC236}">
-                <a16:creationId xmlns:a16="http://schemas.microsoft.com/office/drawing/2014/main" id="{D8E4A746-A713-F510-12EA-00B7D3A8B431}"/>
+                <a16:creationId xmlns:a16="http://schemas.microsoft.com/office/drawing/2014/main" id="{A0FDB19B-678B-2FA2-F0BD-6BE0CC47F157}"/>
               </a:ext>
             </a:extLst>
           </p:cNvPr>
@@ -18770,7 +20162,7 @@
           <a:p>
             <a:r>
               <a:rPr lang="en-US" dirty="0"/>
-              <a:t>Vim script Limitations</a:t>
+              <a:t>Summary</a:t>
             </a:r>
           </a:p>
         </p:txBody>
@@ -18780,7 +20172,7 @@
           <p:cNvPr id="3" name="Content Placeholder 2">
             <a:extLst>
               <a:ext uri="{FF2B5EF4-FFF2-40B4-BE49-F238E27FC236}">
-                <a16:creationId xmlns:a16="http://schemas.microsoft.com/office/drawing/2014/main" id="{F79D0CDA-5E87-7FB6-40CE-76C94BBBF9E6}"/>
+                <a16:creationId xmlns:a16="http://schemas.microsoft.com/office/drawing/2014/main" id="{902235CE-5789-3903-437D-6C0E7360A90A}"/>
               </a:ext>
             </a:extLst>
           </p:cNvPr>
@@ -18798,48 +20190,22 @@
           <a:p>
             <a:r>
               <a:rPr lang="en-US" dirty="0"/>
-              <a:t>No interactive-ness</a:t>
-            </a:r>
-          </a:p>
-          <a:p>
-            <a:pPr lvl="1"/>
+              <a:t>A scripting language that comes packed with an editor</a:t>
+            </a:r>
+          </a:p>
+          <a:p>
             <a:r>
               <a:rPr lang="en-US" dirty="0"/>
-              <a:t>no way to interactively receive input from user</a:t>
-            </a:r>
-          </a:p>
-          <a:p>
-            <a:pPr lvl="1"/>
+              <a:t>Reasonably featureful</a:t>
+            </a:r>
+          </a:p>
+          <a:p>
             <a:r>
               <a:rPr lang="en-US" dirty="0"/>
-              <a:t>no command line </a:t>
-            </a:r>
-            <a:r>
-              <a:rPr lang="en-US" dirty="0" err="1"/>
-              <a:t>args</a:t>
-            </a:r>
-            <a:endParaRPr lang="en-US" dirty="0"/>
-          </a:p>
-          <a:p>
-            <a:pPr lvl="1"/>
-            <a:endParaRPr lang="en-US" dirty="0"/>
-          </a:p>
-          <a:p>
-            <a:r>
-              <a:rPr lang="en-US" dirty="0"/>
-              <a:t>Minimal debugging</a:t>
-            </a:r>
-          </a:p>
-          <a:p>
-            <a:r>
-              <a:rPr lang="en-US" dirty="0"/>
-              <a:t>The quirkiness</a:t>
-            </a:r>
-          </a:p>
-          <a:p>
-            <a:pPr marL="0" indent="0">
-              <a:buNone/>
-            </a:pPr>
+              <a:t>Portable -- works anywhere vim is installed</a:t>
+            </a:r>
+          </a:p>
+          <a:p>
             <a:endParaRPr lang="en-US" dirty="0"/>
           </a:p>
         </p:txBody>
@@ -18847,7 +20213,7 @@
     </p:spTree>
     <p:extLst>
       <p:ext uri="{BB962C8B-B14F-4D97-AF65-F5344CB8AC3E}">
-        <p14:creationId xmlns:p14="http://schemas.microsoft.com/office/powerpoint/2010/main" val="1541640253"/>
+        <p14:creationId xmlns:p14="http://schemas.microsoft.com/office/powerpoint/2010/main" val="1718058050"/>
       </p:ext>
     </p:extLst>
   </p:cSld>
@@ -18857,7 +20223,7 @@
 </p:sld>
 </file>
 
-<file path=ppt/slides/slide24.xml><?xml version="1.0" encoding="utf-8"?>
+<file path=ppt/slides/slide25.xml><?xml version="1.0" encoding="utf-8"?>
 <p:sld xmlns:a="http://schemas.openxmlformats.org/drawingml/2006/main" xmlns:r="http://schemas.openxmlformats.org/officeDocument/2006/relationships" xmlns:p="http://schemas.openxmlformats.org/presentationml/2006/main">
   <p:cSld>
     <p:spTree>
@@ -18925,6 +20291,28 @@
           <a:p>
             <a:r>
               <a:rPr lang="en-US" dirty="0" err="1"/>
+              <a:t>vimdoc.sourceforge.net</a:t>
+            </a:r>
+            <a:endParaRPr lang="en-US" dirty="0"/>
+          </a:p>
+          <a:p>
+            <a:r>
+              <a:rPr lang="en-US" dirty="0" err="1"/>
+              <a:t>blog.prabir.me</a:t>
+            </a:r>
+            <a:r>
+              <a:rPr lang="en-US" dirty="0"/>
+              <a:t>/posts/learning-</a:t>
+            </a:r>
+            <a:r>
+              <a:rPr lang="en-US" dirty="0" err="1"/>
+              <a:t>vimscript</a:t>
+            </a:r>
+            <a:endParaRPr lang="en-US" dirty="0"/>
+          </a:p>
+          <a:p>
+            <a:r>
+              <a:rPr lang="en-US" dirty="0" err="1"/>
               <a:t>begriffs.com</a:t>
             </a:r>
             <a:r>
@@ -18937,7 +20325,7 @@
               <a:rPr lang="en-US" dirty="0" err="1"/>
               <a:t>learnvimscriptthehardway.stevelosh.com</a:t>
             </a:r>
-            <a:endParaRPr lang="en-US"/>
+            <a:endParaRPr lang="en-US" dirty="0"/>
           </a:p>
           <a:p>
             <a:endParaRPr lang="en-US" dirty="0"/>
@@ -18948,6 +20336,64 @@
     <p:extLst>
       <p:ext uri="{BB962C8B-B14F-4D97-AF65-F5344CB8AC3E}">
         <p14:creationId xmlns:p14="http://schemas.microsoft.com/office/powerpoint/2010/main" val="913173913"/>
+      </p:ext>
+    </p:extLst>
+  </p:cSld>
+  <p:clrMapOvr>
+    <a:masterClrMapping/>
+  </p:clrMapOvr>
+</p:sld>
+</file>
+
+<file path=ppt/slides/slide26.xml><?xml version="1.0" encoding="utf-8"?>
+<p:sld xmlns:a="http://schemas.openxmlformats.org/drawingml/2006/main" xmlns:r="http://schemas.openxmlformats.org/officeDocument/2006/relationships" xmlns:p="http://schemas.openxmlformats.org/presentationml/2006/main">
+  <p:cSld>
+    <p:spTree>
+      <p:nvGrpSpPr>
+        <p:cNvPr id="1" name=""/>
+        <p:cNvGrpSpPr/>
+        <p:nvPr/>
+      </p:nvGrpSpPr>
+      <p:grpSpPr>
+        <a:xfrm>
+          <a:off x="0" y="0"/>
+          <a:ext cx="0" cy="0"/>
+          <a:chOff x="0" y="0"/>
+          <a:chExt cx="0" cy="0"/>
+        </a:xfrm>
+      </p:grpSpPr>
+      <p:sp>
+        <p:nvSpPr>
+          <p:cNvPr id="2" name="Title 1">
+            <a:extLst>
+              <a:ext uri="{FF2B5EF4-FFF2-40B4-BE49-F238E27FC236}">
+                <a16:creationId xmlns:a16="http://schemas.microsoft.com/office/drawing/2014/main" id="{C2383374-396B-5D80-A758-D98B3B3ED4CB}"/>
+              </a:ext>
+            </a:extLst>
+          </p:cNvPr>
+          <p:cNvSpPr>
+            <a:spLocks noGrp="1"/>
+          </p:cNvSpPr>
+          <p:nvPr>
+            <p:ph type="title"/>
+          </p:nvPr>
+        </p:nvSpPr>
+        <p:spPr/>
+        <p:txBody>
+          <a:bodyPr/>
+          <a:lstStyle/>
+          <a:p>
+            <a:r>
+              <a:rPr lang="en-US" dirty="0"/>
+              <a:t>Thank you for your time! Questions?</a:t>
+            </a:r>
+          </a:p>
+        </p:txBody>
+      </p:sp>
+    </p:spTree>
+    <p:extLst>
+      <p:ext uri="{BB962C8B-B14F-4D97-AF65-F5344CB8AC3E}">
+        <p14:creationId xmlns:p14="http://schemas.microsoft.com/office/powerpoint/2010/main" val="2118955821"/>
       </p:ext>
     </p:extLst>
   </p:cSld>
@@ -20148,14 +21594,19 @@
             <p:ph type="title"/>
           </p:nvPr>
         </p:nvSpPr>
-        <p:spPr/>
+        <p:spPr>
+          <a:xfrm>
+            <a:off x="429767" y="274320"/>
+            <a:ext cx="11430000" cy="536044"/>
+          </a:xfrm>
+        </p:spPr>
         <p:txBody>
           <a:bodyPr/>
           <a:lstStyle/>
           <a:p>
             <a:r>
               <a:rPr lang="en-US" dirty="0"/>
-              <a:t>LF&amp;E: Variable Scoping 🇳🇱 </a:t>
+              <a:t>LF&amp;E: Variable Scoping (Namespace management) 🇳🇱 </a:t>
             </a:r>
           </a:p>
         </p:txBody>
@@ -20354,7 +21805,14 @@
                 <a:latin typeface="Courier New" panose="02070309020205020404" pitchFamily="49" charset="0"/>
                 <a:cs typeface="Courier New" panose="02070309020205020404" pitchFamily="49" charset="0"/>
               </a:rPr>
-              <a:t>b: </a:t>
+              <a:t>b:</a:t>
+            </a:r>
+            <a:r>
+              <a:rPr lang="en-US" dirty="0">
+                <a:latin typeface="+mn-lt"/>
+                <a:cs typeface="Courier New" panose="02070309020205020404" pitchFamily="49" charset="0"/>
+              </a:rPr>
+              <a:t> </a:t>
             </a:r>
             <a:r>
               <a:rPr lang="en-US" dirty="0"/>
@@ -21574,6 +23032,15 @@
 </file>
 
 <file path=customXml/item1.xml><?xml version="1.0" encoding="utf-8"?>
+<?mso-contentType ?>
+<FormTemplates xmlns="http://schemas.microsoft.com/sharepoint/v3/contenttype/forms">
+  <Display>DocumentLibraryForm</Display>
+  <Edit>DocumentLibraryForm</Edit>
+  <New>DocumentLibraryForm</New>
+</FormTemplates>
+</file>
+
+<file path=customXml/item2.xml><?xml version="1.0" encoding="utf-8"?>
 <ct:contentTypeSchema xmlns:ct="http://schemas.microsoft.com/office/2006/metadata/contentType" xmlns:ma="http://schemas.microsoft.com/office/2006/metadata/properties/metaAttributes" ct:_="" ma:_="" ma:contentTypeName="Document" ma:contentTypeID="0x010100436BFB3AB80EA044897B163D651BE7CF" ma:contentTypeVersion="12" ma:contentTypeDescription="Create a new document." ma:contentTypeScope="" ma:versionID="5ccae34aae965e24db62e9729d4dd5e4">
   <xsd:schema xmlns:xsd="http://www.w3.org/2001/XMLSchema" xmlns:xs="http://www.w3.org/2001/XMLSchema" xmlns:p="http://schemas.microsoft.com/office/2006/metadata/properties" xmlns:ns2="38e4deb0-de08-4adb-aafc-d8ff02544178" targetNamespace="http://schemas.microsoft.com/office/2006/metadata/properties" ma:root="true" ma:fieldsID="73e7bd080f35e63ea4fc24c5765ee755" ns2:_="">
     <xsd:import namespace="38e4deb0-de08-4adb-aafc-d8ff02544178"/>
@@ -21719,15 +23186,6 @@
 </ct:contentTypeSchema>
 </file>
 
-<file path=customXml/item2.xml><?xml version="1.0" encoding="utf-8"?>
-<?mso-contentType ?>
-<FormTemplates xmlns="http://schemas.microsoft.com/sharepoint/v3/contenttype/forms">
-  <Display>DocumentLibraryForm</Display>
-  <Edit>DocumentLibraryForm</Edit>
-  <New>DocumentLibraryForm</New>
-</FormTemplates>
-</file>
-
 <file path=customXml/item3.xml><?xml version="1.0" encoding="utf-8"?>
 <p:properties xmlns:p="http://schemas.microsoft.com/office/2006/metadata/properties" xmlns:xsi="http://www.w3.org/2001/XMLSchema-instance" xmlns:pc="http://schemas.microsoft.com/office/infopath/2007/PartnerControls">
   <documentManagement/>
@@ -21735,6 +23193,14 @@
 </file>
 
 <file path=customXml/itemProps1.xml><?xml version="1.0" encoding="utf-8"?>
+<ds:datastoreItem xmlns:ds="http://schemas.openxmlformats.org/officeDocument/2006/customXml" ds:itemID="{814FB6BD-000C-41AF-9DE8-4264F777F37F}">
+  <ds:schemaRefs>
+    <ds:schemaRef ds:uri="http://schemas.microsoft.com/sharepoint/v3/contenttype/forms"/>
+  </ds:schemaRefs>
+</ds:datastoreItem>
+</file>
+
+<file path=customXml/itemProps2.xml><?xml version="1.0" encoding="utf-8"?>
 <ds:datastoreItem xmlns:ds="http://schemas.openxmlformats.org/officeDocument/2006/customXml" ds:itemID="{78EF5AA9-B8DF-4DC7-90A1-A91BA595B6A2}">
   <ds:schemaRefs>
     <ds:schemaRef ds:uri="http://schemas.microsoft.com/office/2006/metadata/contentType"/>
@@ -21748,14 +23214,6 @@
     <ds:schemaRef ds:uri="http://purl.org/dc/elements/1.1/"/>
     <ds:schemaRef ds:uri="http://purl.org/dc/terms/"/>
     <ds:schemaRef ds:uri="http://schemas.microsoft.com/internal/obd"/>
-  </ds:schemaRefs>
-</ds:datastoreItem>
-</file>
-
-<file path=customXml/itemProps2.xml><?xml version="1.0" encoding="utf-8"?>
-<ds:datastoreItem xmlns:ds="http://schemas.openxmlformats.org/officeDocument/2006/customXml" ds:itemID="{814FB6BD-000C-41AF-9DE8-4264F777F37F}">
-  <ds:schemaRefs>
-    <ds:schemaRef ds:uri="http://schemas.microsoft.com/sharepoint/v3/contenttype/forms"/>
   </ds:schemaRefs>
 </ds:datastoreItem>
 </file>

</xml_diff>

<commit_message>
more examples and more mods to slides
</commit_message>
<xml_diff>
--- a/vimscriptpres.pptx
+++ b/vimscriptpres.pptx
@@ -19334,12 +19334,509 @@
             <p:ph idx="1"/>
           </p:nvPr>
         </p:nvSpPr>
-        <p:spPr/>
+        <p:spPr>
+          <a:xfrm>
+            <a:off x="448055" y="1653735"/>
+            <a:ext cx="5527075" cy="4047778"/>
+          </a:xfrm>
+        </p:spPr>
         <p:txBody>
           <a:bodyPr/>
           <a:lstStyle/>
           <a:p>
-            <a:endParaRPr lang="en-US" dirty="0"/>
+            <a:r>
+              <a:rPr lang="en-US" dirty="0"/>
+              <a:t>Functions may be assigned to variables as references using the </a:t>
+            </a:r>
+            <a:r>
+              <a:rPr lang="en-US" dirty="0">
+                <a:latin typeface="Courier New" panose="02070309020205020404" pitchFamily="49" charset="0"/>
+                <a:cs typeface="Courier New" panose="02070309020205020404" pitchFamily="49" charset="0"/>
+              </a:rPr>
+              <a:t>function() </a:t>
+            </a:r>
+            <a:r>
+              <a:rPr lang="en-US" dirty="0"/>
+              <a:t>function🇳🇱</a:t>
+            </a:r>
+          </a:p>
+          <a:p>
+            <a:r>
+              <a:rPr lang="en-US" dirty="0"/>
+              <a:t>The variable that holds a function reference is of type </a:t>
+            </a:r>
+            <a:r>
+              <a:rPr lang="en-US" dirty="0" err="1">
+                <a:latin typeface="Courier New" panose="02070309020205020404" pitchFamily="49" charset="0"/>
+                <a:cs typeface="Courier New" panose="02070309020205020404" pitchFamily="49" charset="0"/>
+              </a:rPr>
+              <a:t>funcref</a:t>
+            </a:r>
+            <a:endParaRPr lang="en-US" dirty="0">
+              <a:latin typeface="Courier New" panose="02070309020205020404" pitchFamily="49" charset="0"/>
+              <a:cs typeface="Courier New" panose="02070309020205020404" pitchFamily="49" charset="0"/>
+            </a:endParaRPr>
+          </a:p>
+          <a:p>
+            <a:r>
+              <a:rPr lang="en-US" dirty="0" err="1"/>
+              <a:t>Funcref</a:t>
+            </a:r>
+            <a:r>
+              <a:rPr lang="en-US" dirty="0"/>
+              <a:t> variable name must start with a capital letter</a:t>
+            </a:r>
+          </a:p>
+        </p:txBody>
+      </p:sp>
+      <p:sp>
+        <p:nvSpPr>
+          <p:cNvPr id="4" name="Content Placeholder 2">
+            <a:extLst>
+              <a:ext uri="{FF2B5EF4-FFF2-40B4-BE49-F238E27FC236}">
+                <a16:creationId xmlns:a16="http://schemas.microsoft.com/office/drawing/2014/main" id="{AA263545-6C67-BD5B-B4EB-BAC1589D2A6A}"/>
+              </a:ext>
+            </a:extLst>
+          </p:cNvPr>
+          <p:cNvSpPr txBox="1">
+            <a:spLocks/>
+          </p:cNvSpPr>
+          <p:nvPr/>
+        </p:nvSpPr>
+        <p:spPr bwMode="auto">
+          <a:xfrm>
+            <a:off x="5975130" y="1237594"/>
+            <a:ext cx="6216871" cy="5052847"/>
+          </a:xfrm>
+          <a:prstGeom prst="rect">
+            <a:avLst/>
+          </a:prstGeom>
+          <a:noFill/>
+          <a:ln w="9525">
+            <a:solidFill>
+              <a:schemeClr val="accent1"/>
+            </a:solidFill>
+            <a:miter lim="800000"/>
+            <a:headEnd/>
+            <a:tailEnd/>
+          </a:ln>
+        </p:spPr>
+        <p:txBody>
+          <a:bodyPr vert="horz" wrap="square" lIns="91440" tIns="45720" rIns="91440" bIns="45720" numCol="1" anchor="t" anchorCtr="0" compatLnSpc="1">
+            <a:prstTxWarp prst="textNoShape">
+              <a:avLst/>
+            </a:prstTxWarp>
+            <a:noAutofit/>
+          </a:bodyPr>
+          <a:lstStyle>
+            <a:lvl1pPr marL="288925" indent="-288925" algn="l" rtl="0" eaLnBrk="1" fontAlgn="base" hangingPunct="1">
+              <a:lnSpc>
+                <a:spcPct val="90000"/>
+              </a:lnSpc>
+              <a:spcBef>
+                <a:spcPts val="1800"/>
+              </a:spcBef>
+              <a:spcAft>
+                <a:spcPct val="0"/>
+              </a:spcAft>
+              <a:buClr>
+                <a:schemeClr val="tx1"/>
+              </a:buClr>
+              <a:buSzPct val="90000"/>
+              <a:buFont typeface="Century Gothic" panose="020B0502020202020204" pitchFamily="34" charset="0"/>
+              <a:buChar char="•"/>
+              <a:defRPr lang="en-US" sz="2800" kern="1200" dirty="0">
+                <a:solidFill>
+                  <a:schemeClr val="tx1"/>
+                </a:solidFill>
+                <a:latin typeface="Century Gothic" panose="020B0502020202020204" pitchFamily="34" charset="0"/>
+                <a:ea typeface="+mn-ea"/>
+                <a:cs typeface="+mn-cs"/>
+              </a:defRPr>
+            </a:lvl1pPr>
+            <a:lvl2pPr marL="687388" indent="-288925" algn="l" rtl="0" eaLnBrk="1" fontAlgn="base" hangingPunct="1">
+              <a:lnSpc>
+                <a:spcPct val="90000"/>
+              </a:lnSpc>
+              <a:spcBef>
+                <a:spcPts val="800"/>
+              </a:spcBef>
+              <a:spcAft>
+                <a:spcPct val="0"/>
+              </a:spcAft>
+              <a:buClr>
+                <a:schemeClr val="tx1"/>
+              </a:buClr>
+              <a:buSzPct val="90000"/>
+              <a:buFont typeface="Century Gothic" panose="020B0502020202020204" pitchFamily="34" charset="0"/>
+              <a:buChar char="–"/>
+              <a:defRPr sz="2400" kern="1200">
+                <a:solidFill>
+                  <a:schemeClr val="tx1"/>
+                </a:solidFill>
+                <a:latin typeface="+mn-lt"/>
+                <a:ea typeface="+mn-ea"/>
+                <a:cs typeface="Arial" panose="020B0604020202020204" pitchFamily="34" charset="0"/>
+              </a:defRPr>
+            </a:lvl2pPr>
+            <a:lvl3pPr marL="1031875" indent="-288925" algn="l" rtl="0" eaLnBrk="1" fontAlgn="base" hangingPunct="1">
+              <a:lnSpc>
+                <a:spcPct val="90000"/>
+              </a:lnSpc>
+              <a:spcBef>
+                <a:spcPts val="800"/>
+              </a:spcBef>
+              <a:spcAft>
+                <a:spcPct val="0"/>
+              </a:spcAft>
+              <a:buClr>
+                <a:schemeClr val="tx1"/>
+              </a:buClr>
+              <a:buSzPct val="90000"/>
+              <a:buFont typeface="Century Gothic" panose="020B0502020202020204" pitchFamily="34" charset="0"/>
+              <a:buChar char="•"/>
+              <a:defRPr sz="2000" kern="1200">
+                <a:solidFill>
+                  <a:schemeClr val="tx1"/>
+                </a:solidFill>
+                <a:latin typeface="+mn-lt"/>
+                <a:ea typeface="+mn-ea"/>
+                <a:cs typeface="Arial" panose="020B0604020202020204" pitchFamily="34" charset="0"/>
+              </a:defRPr>
+            </a:lvl3pPr>
+            <a:lvl4pPr marL="1144588" indent="-173038" algn="l" rtl="0" eaLnBrk="1" fontAlgn="base" hangingPunct="1">
+              <a:lnSpc>
+                <a:spcPct val="90000"/>
+              </a:lnSpc>
+              <a:spcBef>
+                <a:spcPts val="800"/>
+              </a:spcBef>
+              <a:spcAft>
+                <a:spcPct val="0"/>
+              </a:spcAft>
+              <a:buClr>
+                <a:schemeClr val="tx1"/>
+              </a:buClr>
+              <a:buFont typeface="Arial" charset="0"/>
+              <a:buChar char="–"/>
+              <a:defRPr sz="1800" kern="1200">
+                <a:solidFill>
+                  <a:schemeClr val="tx1"/>
+                </a:solidFill>
+                <a:latin typeface="+mn-lt"/>
+                <a:ea typeface="+mn-ea"/>
+                <a:cs typeface="Arial" panose="020B0604020202020204" pitchFamily="34" charset="0"/>
+              </a:defRPr>
+            </a:lvl4pPr>
+            <a:lvl5pPr marL="1482725" indent="-222250" algn="l" rtl="0" eaLnBrk="1" fontAlgn="base" hangingPunct="1">
+              <a:lnSpc>
+                <a:spcPct val="90000"/>
+              </a:lnSpc>
+              <a:spcBef>
+                <a:spcPts val="600"/>
+              </a:spcBef>
+              <a:spcAft>
+                <a:spcPct val="0"/>
+              </a:spcAft>
+              <a:buClr>
+                <a:schemeClr val="tx1"/>
+              </a:buClr>
+              <a:buFont typeface="Arial" panose="020B0604020202020204" pitchFamily="34" charset="0"/>
+              <a:buChar char="•"/>
+              <a:defRPr sz="1800" kern="1200">
+                <a:solidFill>
+                  <a:schemeClr val="tx1"/>
+                </a:solidFill>
+                <a:latin typeface="+mn-lt"/>
+                <a:ea typeface="+mn-ea"/>
+                <a:cs typeface="Arial" panose="020B0604020202020204" pitchFamily="34" charset="0"/>
+              </a:defRPr>
+            </a:lvl5pPr>
+            <a:lvl6pPr marL="2514600" indent="-228600" algn="l" defTabSz="914400" rtl="0" eaLnBrk="1" latinLnBrk="0" hangingPunct="1">
+              <a:spcBef>
+                <a:spcPct val="20000"/>
+              </a:spcBef>
+              <a:buFont typeface="Arial" pitchFamily="34" charset="0"/>
+              <a:buChar char="•"/>
+              <a:defRPr sz="2000" kern="1200">
+                <a:solidFill>
+                  <a:schemeClr val="tx1"/>
+                </a:solidFill>
+                <a:latin typeface="+mn-lt"/>
+                <a:ea typeface="+mn-ea"/>
+                <a:cs typeface="+mn-cs"/>
+              </a:defRPr>
+            </a:lvl6pPr>
+            <a:lvl7pPr marL="2971800" indent="-228600" algn="l" defTabSz="914400" rtl="0" eaLnBrk="1" latinLnBrk="0" hangingPunct="1">
+              <a:spcBef>
+                <a:spcPct val="20000"/>
+              </a:spcBef>
+              <a:buFont typeface="Arial" pitchFamily="34" charset="0"/>
+              <a:buChar char="•"/>
+              <a:defRPr sz="2000" kern="1200">
+                <a:solidFill>
+                  <a:schemeClr val="tx1"/>
+                </a:solidFill>
+                <a:latin typeface="+mn-lt"/>
+                <a:ea typeface="+mn-ea"/>
+                <a:cs typeface="+mn-cs"/>
+              </a:defRPr>
+            </a:lvl7pPr>
+            <a:lvl8pPr marL="3429000" indent="-228600" algn="l" defTabSz="914400" rtl="0" eaLnBrk="1" latinLnBrk="0" hangingPunct="1">
+              <a:spcBef>
+                <a:spcPct val="20000"/>
+              </a:spcBef>
+              <a:buFont typeface="Arial" pitchFamily="34" charset="0"/>
+              <a:buChar char="•"/>
+              <a:defRPr sz="2000" kern="1200">
+                <a:solidFill>
+                  <a:schemeClr val="tx1"/>
+                </a:solidFill>
+                <a:latin typeface="+mn-lt"/>
+                <a:ea typeface="+mn-ea"/>
+                <a:cs typeface="+mn-cs"/>
+              </a:defRPr>
+            </a:lvl8pPr>
+            <a:lvl9pPr marL="3886200" indent="-228600" algn="l" defTabSz="914400" rtl="0" eaLnBrk="1" latinLnBrk="0" hangingPunct="1">
+              <a:spcBef>
+                <a:spcPct val="20000"/>
+              </a:spcBef>
+              <a:buFont typeface="Arial" pitchFamily="34" charset="0"/>
+              <a:buChar char="•"/>
+              <a:defRPr sz="2000" kern="1200">
+                <a:solidFill>
+                  <a:schemeClr val="tx1"/>
+                </a:solidFill>
+                <a:latin typeface="+mn-lt"/>
+                <a:ea typeface="+mn-ea"/>
+                <a:cs typeface="+mn-cs"/>
+              </a:defRPr>
+            </a:lvl9pPr>
+          </a:lstStyle>
+          <a:p>
+            <a:pPr marL="0" indent="0">
+              <a:buNone/>
+            </a:pPr>
+            <a:r>
+              <a:rPr lang="en-US" sz="2000" dirty="0">
+                <a:latin typeface="Courier New" panose="02070309020205020404" pitchFamily="49" charset="0"/>
+                <a:cs typeface="Courier New" panose="02070309020205020404" pitchFamily="49" charset="0"/>
+              </a:rPr>
+              <a:t>function Fizzbuzz(n)</a:t>
+            </a:r>
+            <a:br>
+              <a:rPr lang="en-US" sz="2000" dirty="0">
+                <a:latin typeface="Courier New" panose="02070309020205020404" pitchFamily="49" charset="0"/>
+                <a:cs typeface="Courier New" panose="02070309020205020404" pitchFamily="49" charset="0"/>
+              </a:rPr>
+            </a:br>
+            <a:r>
+              <a:rPr lang="en-US" sz="2000" dirty="0">
+                <a:latin typeface="Courier New" panose="02070309020205020404" pitchFamily="49" charset="0"/>
+                <a:cs typeface="Courier New" panose="02070309020205020404" pitchFamily="49" charset="0"/>
+              </a:rPr>
+              <a:t>  if a:n % 3 == 0 &amp;&amp; a:n % 5 == 0</a:t>
+            </a:r>
+            <a:br>
+              <a:rPr lang="en-US" sz="2000" dirty="0">
+                <a:latin typeface="Courier New" panose="02070309020205020404" pitchFamily="49" charset="0"/>
+                <a:cs typeface="Courier New" panose="02070309020205020404" pitchFamily="49" charset="0"/>
+              </a:rPr>
+            </a:br>
+            <a:r>
+              <a:rPr lang="en-US" sz="2000" dirty="0">
+                <a:latin typeface="Courier New" panose="02070309020205020404" pitchFamily="49" charset="0"/>
+                <a:cs typeface="Courier New" panose="02070309020205020404" pitchFamily="49" charset="0"/>
+              </a:rPr>
+              <a:t>    return “</a:t>
+            </a:r>
+            <a:r>
+              <a:rPr lang="en-US" sz="2000" dirty="0" err="1">
+                <a:latin typeface="Courier New" panose="02070309020205020404" pitchFamily="49" charset="0"/>
+                <a:cs typeface="Courier New" panose="02070309020205020404" pitchFamily="49" charset="0"/>
+              </a:rPr>
+              <a:t>FizzBuzz</a:t>
+            </a:r>
+            <a:r>
+              <a:rPr lang="en-US" sz="2000" dirty="0">
+                <a:latin typeface="Courier New" panose="02070309020205020404" pitchFamily="49" charset="0"/>
+                <a:cs typeface="Courier New" panose="02070309020205020404" pitchFamily="49" charset="0"/>
+              </a:rPr>
+              <a:t>”</a:t>
+            </a:r>
+            <a:br>
+              <a:rPr lang="en-US" sz="2000" dirty="0">
+                <a:latin typeface="Courier New" panose="02070309020205020404" pitchFamily="49" charset="0"/>
+                <a:cs typeface="Courier New" panose="02070309020205020404" pitchFamily="49" charset="0"/>
+              </a:rPr>
+            </a:br>
+            <a:r>
+              <a:rPr lang="en-US" sz="2000" dirty="0">
+                <a:latin typeface="Courier New" panose="02070309020205020404" pitchFamily="49" charset="0"/>
+                <a:cs typeface="Courier New" panose="02070309020205020404" pitchFamily="49" charset="0"/>
+              </a:rPr>
+              <a:t>  elseif a:n % 3 == 0</a:t>
+            </a:r>
+            <a:br>
+              <a:rPr lang="en-US" sz="2000" dirty="0">
+                <a:latin typeface="Courier New" panose="02070309020205020404" pitchFamily="49" charset="0"/>
+                <a:cs typeface="Courier New" panose="02070309020205020404" pitchFamily="49" charset="0"/>
+              </a:rPr>
+            </a:br>
+            <a:r>
+              <a:rPr lang="en-US" sz="2000" dirty="0">
+                <a:latin typeface="Courier New" panose="02070309020205020404" pitchFamily="49" charset="0"/>
+                <a:cs typeface="Courier New" panose="02070309020205020404" pitchFamily="49" charset="0"/>
+              </a:rPr>
+              <a:t>    return “Fizz”</a:t>
+            </a:r>
+            <a:br>
+              <a:rPr lang="en-US" sz="2000" dirty="0">
+                <a:latin typeface="Courier New" panose="02070309020205020404" pitchFamily="49" charset="0"/>
+                <a:cs typeface="Courier New" panose="02070309020205020404" pitchFamily="49" charset="0"/>
+              </a:rPr>
+            </a:br>
+            <a:r>
+              <a:rPr lang="en-US" sz="2000" dirty="0">
+                <a:latin typeface="Courier New" panose="02070309020205020404" pitchFamily="49" charset="0"/>
+                <a:cs typeface="Courier New" panose="02070309020205020404" pitchFamily="49" charset="0"/>
+              </a:rPr>
+              <a:t>  elseif a:n % 5 == 0</a:t>
+            </a:r>
+            <a:br>
+              <a:rPr lang="en-US" sz="2000" dirty="0">
+                <a:latin typeface="Courier New" panose="02070309020205020404" pitchFamily="49" charset="0"/>
+                <a:cs typeface="Courier New" panose="02070309020205020404" pitchFamily="49" charset="0"/>
+              </a:rPr>
+            </a:br>
+            <a:r>
+              <a:rPr lang="en-US" sz="2000" dirty="0">
+                <a:latin typeface="Courier New" panose="02070309020205020404" pitchFamily="49" charset="0"/>
+                <a:cs typeface="Courier New" panose="02070309020205020404" pitchFamily="49" charset="0"/>
+              </a:rPr>
+              <a:t>    return “Buzz”</a:t>
+            </a:r>
+            <a:br>
+              <a:rPr lang="en-US" sz="2000" dirty="0">
+                <a:latin typeface="Courier New" panose="02070309020205020404" pitchFamily="49" charset="0"/>
+                <a:cs typeface="Courier New" panose="02070309020205020404" pitchFamily="49" charset="0"/>
+              </a:rPr>
+            </a:br>
+            <a:r>
+              <a:rPr lang="en-US" sz="2000" dirty="0">
+                <a:latin typeface="Courier New" panose="02070309020205020404" pitchFamily="49" charset="0"/>
+                <a:cs typeface="Courier New" panose="02070309020205020404" pitchFamily="49" charset="0"/>
+              </a:rPr>
+              <a:t>  else</a:t>
+            </a:r>
+            <a:br>
+              <a:rPr lang="en-US" sz="2000" dirty="0">
+                <a:latin typeface="Courier New" panose="02070309020205020404" pitchFamily="49" charset="0"/>
+                <a:cs typeface="Courier New" panose="02070309020205020404" pitchFamily="49" charset="0"/>
+              </a:rPr>
+            </a:br>
+            <a:r>
+              <a:rPr lang="en-US" sz="2000" dirty="0">
+                <a:latin typeface="Courier New" panose="02070309020205020404" pitchFamily="49" charset="0"/>
+                <a:cs typeface="Courier New" panose="02070309020205020404" pitchFamily="49" charset="0"/>
+              </a:rPr>
+              <a:t>    return “None”</a:t>
+            </a:r>
+            <a:br>
+              <a:rPr lang="en-US" sz="2000" dirty="0">
+                <a:latin typeface="Courier New" panose="02070309020205020404" pitchFamily="49" charset="0"/>
+                <a:cs typeface="Courier New" panose="02070309020205020404" pitchFamily="49" charset="0"/>
+              </a:rPr>
+            </a:br>
+            <a:r>
+              <a:rPr lang="en-US" sz="2000" dirty="0">
+                <a:latin typeface="Courier New" panose="02070309020205020404" pitchFamily="49" charset="0"/>
+                <a:cs typeface="Courier New" panose="02070309020205020404" pitchFamily="49" charset="0"/>
+              </a:rPr>
+              <a:t>  endif</a:t>
+            </a:r>
+            <a:br>
+              <a:rPr lang="en-US" sz="2000" dirty="0">
+                <a:latin typeface="Courier New" panose="02070309020205020404" pitchFamily="49" charset="0"/>
+                <a:cs typeface="Courier New" panose="02070309020205020404" pitchFamily="49" charset="0"/>
+              </a:rPr>
+            </a:br>
+            <a:r>
+              <a:rPr lang="en-US" sz="2000" dirty="0" err="1">
+                <a:latin typeface="Courier New" panose="02070309020205020404" pitchFamily="49" charset="0"/>
+                <a:cs typeface="Courier New" panose="02070309020205020404" pitchFamily="49" charset="0"/>
+              </a:rPr>
+              <a:t>endfunction</a:t>
+            </a:r>
+            <a:endParaRPr lang="en-US" sz="2000" dirty="0">
+              <a:latin typeface="Courier New" panose="02070309020205020404" pitchFamily="49" charset="0"/>
+              <a:cs typeface="Courier New" panose="02070309020205020404" pitchFamily="49" charset="0"/>
+            </a:endParaRPr>
+          </a:p>
+          <a:p>
+            <a:pPr marL="0" indent="0">
+              <a:buNone/>
+            </a:pPr>
+            <a:r>
+              <a:rPr lang="en-US" sz="2000" dirty="0">
+                <a:latin typeface="Courier New" panose="02070309020205020404" pitchFamily="49" charset="0"/>
+                <a:cs typeface="Courier New" panose="02070309020205020404" pitchFamily="49" charset="0"/>
+              </a:rPr>
+              <a:t>let Afunc = function('</a:t>
+            </a:r>
+            <a:r>
+              <a:rPr lang="en-US" sz="2000" dirty="0" err="1">
+                <a:latin typeface="Courier New" panose="02070309020205020404" pitchFamily="49" charset="0"/>
+                <a:cs typeface="Courier New" panose="02070309020205020404" pitchFamily="49" charset="0"/>
+              </a:rPr>
+              <a:t>Fizzbuzz</a:t>
+            </a:r>
+            <a:r>
+              <a:rPr lang="en-US" sz="2000" dirty="0">
+                <a:latin typeface="Courier New" panose="02070309020205020404" pitchFamily="49" charset="0"/>
+                <a:cs typeface="Courier New" panose="02070309020205020404" pitchFamily="49" charset="0"/>
+              </a:rPr>
+              <a:t>’)</a:t>
+            </a:r>
+            <a:br>
+              <a:rPr lang="en-US" sz="2000" dirty="0">
+                <a:latin typeface="Courier New" panose="02070309020205020404" pitchFamily="49" charset="0"/>
+                <a:cs typeface="Courier New" panose="02070309020205020404" pitchFamily="49" charset="0"/>
+              </a:rPr>
+            </a:br>
+            <a:br>
+              <a:rPr lang="en-US" sz="2000" dirty="0">
+                <a:latin typeface="Courier New" panose="02070309020205020404" pitchFamily="49" charset="0"/>
+                <a:cs typeface="Courier New" panose="02070309020205020404" pitchFamily="49" charset="0"/>
+              </a:rPr>
+            </a:br>
+            <a:r>
+              <a:rPr lang="en-US" sz="2000" dirty="0">
+                <a:latin typeface="Courier New" panose="02070309020205020404" pitchFamily="49" charset="0"/>
+                <a:cs typeface="Courier New" panose="02070309020205020404" pitchFamily="49" charset="0"/>
+              </a:rPr>
+              <a:t>“call function may be used to invoke the function referred to by the </a:t>
+            </a:r>
+            <a:r>
+              <a:rPr lang="en-US" sz="2000" dirty="0" err="1">
+                <a:latin typeface="Courier New" panose="02070309020205020404" pitchFamily="49" charset="0"/>
+                <a:cs typeface="Courier New" panose="02070309020205020404" pitchFamily="49" charset="0"/>
+              </a:rPr>
+              <a:t>funcref</a:t>
+            </a:r>
+            <a:br>
+              <a:rPr lang="en-US" sz="2000" dirty="0">
+                <a:latin typeface="Courier New" panose="02070309020205020404" pitchFamily="49" charset="0"/>
+                <a:cs typeface="Courier New" panose="02070309020205020404" pitchFamily="49" charset="0"/>
+              </a:rPr>
+            </a:br>
+            <a:r>
+              <a:rPr lang="en-US" sz="2000" dirty="0">
+                <a:latin typeface="Courier New" panose="02070309020205020404" pitchFamily="49" charset="0"/>
+                <a:cs typeface="Courier New" panose="02070309020205020404" pitchFamily="49" charset="0"/>
+              </a:rPr>
+              <a:t>echo call(Afunc, [15])</a:t>
+            </a:r>
           </a:p>
         </p:txBody>
       </p:sp>
@@ -19400,7 +19897,7 @@
             </a:r>
             <a:r>
               <a:rPr lang="en-US" dirty="0"/>
-              <a:t> Functions</a:t>
+              <a:t> Functions 🇳🇱🤯</a:t>
             </a:r>
           </a:p>
         </p:txBody>
@@ -19421,12 +19918,485 @@
             <p:ph idx="1"/>
           </p:nvPr>
         </p:nvSpPr>
-        <p:spPr/>
+        <p:spPr>
+          <a:xfrm>
+            <a:off x="448055" y="1237594"/>
+            <a:ext cx="5527075" cy="5052847"/>
+          </a:xfrm>
+        </p:spPr>
         <p:txBody>
           <a:bodyPr/>
           <a:lstStyle/>
           <a:p>
-            <a:endParaRPr lang="en-US"/>
+            <a:r>
+              <a:rPr lang="en-US" dirty="0"/>
+              <a:t>Functions can be directly associated with a dictionary!</a:t>
+            </a:r>
+          </a:p>
+          <a:p>
+            <a:r>
+              <a:rPr lang="en-US" dirty="0"/>
+              <a:t>Apparently, they need not be starting with a capital letter!</a:t>
+            </a:r>
+          </a:p>
+          <a:p>
+            <a:r>
+              <a:rPr lang="en-US" dirty="0"/>
+              <a:t>The </a:t>
+            </a:r>
+            <a:r>
+              <a:rPr lang="en-US" dirty="0" err="1"/>
+              <a:t>dict</a:t>
+            </a:r>
+            <a:r>
+              <a:rPr lang="en-US" dirty="0"/>
+              <a:t> is referred using self inside the function</a:t>
+            </a:r>
+          </a:p>
+          <a:p>
+            <a:r>
+              <a:rPr lang="en-US" dirty="0"/>
+              <a:t>A </a:t>
+            </a:r>
+            <a:r>
+              <a:rPr lang="en-US" dirty="0" err="1"/>
+              <a:t>dict</a:t>
+            </a:r>
+            <a:r>
+              <a:rPr lang="en-US" dirty="0"/>
+              <a:t> function may be invoked using . on the </a:t>
+            </a:r>
+            <a:r>
+              <a:rPr lang="en-US" dirty="0" err="1"/>
+              <a:t>dict</a:t>
+            </a:r>
+            <a:endParaRPr lang="en-US" dirty="0"/>
+          </a:p>
+        </p:txBody>
+      </p:sp>
+      <p:sp>
+        <p:nvSpPr>
+          <p:cNvPr id="4" name="Content Placeholder 2">
+            <a:extLst>
+              <a:ext uri="{FF2B5EF4-FFF2-40B4-BE49-F238E27FC236}">
+                <a16:creationId xmlns:a16="http://schemas.microsoft.com/office/drawing/2014/main" id="{8F6FCC6F-4C50-6E89-90D1-1A879907BA14}"/>
+              </a:ext>
+            </a:extLst>
+          </p:cNvPr>
+          <p:cNvSpPr txBox="1">
+            <a:spLocks/>
+          </p:cNvSpPr>
+          <p:nvPr/>
+        </p:nvSpPr>
+        <p:spPr bwMode="auto">
+          <a:xfrm>
+            <a:off x="5975130" y="1237594"/>
+            <a:ext cx="6216871" cy="5052847"/>
+          </a:xfrm>
+          <a:prstGeom prst="rect">
+            <a:avLst/>
+          </a:prstGeom>
+          <a:noFill/>
+          <a:ln w="9525">
+            <a:solidFill>
+              <a:schemeClr val="accent1"/>
+            </a:solidFill>
+            <a:miter lim="800000"/>
+            <a:headEnd/>
+            <a:tailEnd/>
+          </a:ln>
+        </p:spPr>
+        <p:txBody>
+          <a:bodyPr vert="horz" wrap="square" lIns="91440" tIns="45720" rIns="91440" bIns="45720" numCol="1" anchor="t" anchorCtr="0" compatLnSpc="1">
+            <a:prstTxWarp prst="textNoShape">
+              <a:avLst/>
+            </a:prstTxWarp>
+            <a:noAutofit/>
+          </a:bodyPr>
+          <a:lstStyle>
+            <a:lvl1pPr marL="288925" indent="-288925" algn="l" rtl="0" eaLnBrk="1" fontAlgn="base" hangingPunct="1">
+              <a:lnSpc>
+                <a:spcPct val="90000"/>
+              </a:lnSpc>
+              <a:spcBef>
+                <a:spcPts val="1800"/>
+              </a:spcBef>
+              <a:spcAft>
+                <a:spcPct val="0"/>
+              </a:spcAft>
+              <a:buClr>
+                <a:schemeClr val="tx1"/>
+              </a:buClr>
+              <a:buSzPct val="90000"/>
+              <a:buFont typeface="Century Gothic" panose="020B0502020202020204" pitchFamily="34" charset="0"/>
+              <a:buChar char="•"/>
+              <a:defRPr lang="en-US" sz="2800" kern="1200" dirty="0">
+                <a:solidFill>
+                  <a:schemeClr val="tx1"/>
+                </a:solidFill>
+                <a:latin typeface="Century Gothic" panose="020B0502020202020204" pitchFamily="34" charset="0"/>
+                <a:ea typeface="+mn-ea"/>
+                <a:cs typeface="+mn-cs"/>
+              </a:defRPr>
+            </a:lvl1pPr>
+            <a:lvl2pPr marL="687388" indent="-288925" algn="l" rtl="0" eaLnBrk="1" fontAlgn="base" hangingPunct="1">
+              <a:lnSpc>
+                <a:spcPct val="90000"/>
+              </a:lnSpc>
+              <a:spcBef>
+                <a:spcPts val="800"/>
+              </a:spcBef>
+              <a:spcAft>
+                <a:spcPct val="0"/>
+              </a:spcAft>
+              <a:buClr>
+                <a:schemeClr val="tx1"/>
+              </a:buClr>
+              <a:buSzPct val="90000"/>
+              <a:buFont typeface="Century Gothic" panose="020B0502020202020204" pitchFamily="34" charset="0"/>
+              <a:buChar char="–"/>
+              <a:defRPr sz="2400" kern="1200">
+                <a:solidFill>
+                  <a:schemeClr val="tx1"/>
+                </a:solidFill>
+                <a:latin typeface="+mn-lt"/>
+                <a:ea typeface="+mn-ea"/>
+                <a:cs typeface="Arial" panose="020B0604020202020204" pitchFamily="34" charset="0"/>
+              </a:defRPr>
+            </a:lvl2pPr>
+            <a:lvl3pPr marL="1031875" indent="-288925" algn="l" rtl="0" eaLnBrk="1" fontAlgn="base" hangingPunct="1">
+              <a:lnSpc>
+                <a:spcPct val="90000"/>
+              </a:lnSpc>
+              <a:spcBef>
+                <a:spcPts val="800"/>
+              </a:spcBef>
+              <a:spcAft>
+                <a:spcPct val="0"/>
+              </a:spcAft>
+              <a:buClr>
+                <a:schemeClr val="tx1"/>
+              </a:buClr>
+              <a:buSzPct val="90000"/>
+              <a:buFont typeface="Century Gothic" panose="020B0502020202020204" pitchFamily="34" charset="0"/>
+              <a:buChar char="•"/>
+              <a:defRPr sz="2000" kern="1200">
+                <a:solidFill>
+                  <a:schemeClr val="tx1"/>
+                </a:solidFill>
+                <a:latin typeface="+mn-lt"/>
+                <a:ea typeface="+mn-ea"/>
+                <a:cs typeface="Arial" panose="020B0604020202020204" pitchFamily="34" charset="0"/>
+              </a:defRPr>
+            </a:lvl3pPr>
+            <a:lvl4pPr marL="1144588" indent="-173038" algn="l" rtl="0" eaLnBrk="1" fontAlgn="base" hangingPunct="1">
+              <a:lnSpc>
+                <a:spcPct val="90000"/>
+              </a:lnSpc>
+              <a:spcBef>
+                <a:spcPts val="800"/>
+              </a:spcBef>
+              <a:spcAft>
+                <a:spcPct val="0"/>
+              </a:spcAft>
+              <a:buClr>
+                <a:schemeClr val="tx1"/>
+              </a:buClr>
+              <a:buFont typeface="Arial" charset="0"/>
+              <a:buChar char="–"/>
+              <a:defRPr sz="1800" kern="1200">
+                <a:solidFill>
+                  <a:schemeClr val="tx1"/>
+                </a:solidFill>
+                <a:latin typeface="+mn-lt"/>
+                <a:ea typeface="+mn-ea"/>
+                <a:cs typeface="Arial" panose="020B0604020202020204" pitchFamily="34" charset="0"/>
+              </a:defRPr>
+            </a:lvl4pPr>
+            <a:lvl5pPr marL="1482725" indent="-222250" algn="l" rtl="0" eaLnBrk="1" fontAlgn="base" hangingPunct="1">
+              <a:lnSpc>
+                <a:spcPct val="90000"/>
+              </a:lnSpc>
+              <a:spcBef>
+                <a:spcPts val="600"/>
+              </a:spcBef>
+              <a:spcAft>
+                <a:spcPct val="0"/>
+              </a:spcAft>
+              <a:buClr>
+                <a:schemeClr val="tx1"/>
+              </a:buClr>
+              <a:buFont typeface="Arial" panose="020B0604020202020204" pitchFamily="34" charset="0"/>
+              <a:buChar char="•"/>
+              <a:defRPr sz="1800" kern="1200">
+                <a:solidFill>
+                  <a:schemeClr val="tx1"/>
+                </a:solidFill>
+                <a:latin typeface="+mn-lt"/>
+                <a:ea typeface="+mn-ea"/>
+                <a:cs typeface="Arial" panose="020B0604020202020204" pitchFamily="34" charset="0"/>
+              </a:defRPr>
+            </a:lvl5pPr>
+            <a:lvl6pPr marL="2514600" indent="-228600" algn="l" defTabSz="914400" rtl="0" eaLnBrk="1" latinLnBrk="0" hangingPunct="1">
+              <a:spcBef>
+                <a:spcPct val="20000"/>
+              </a:spcBef>
+              <a:buFont typeface="Arial" pitchFamily="34" charset="0"/>
+              <a:buChar char="•"/>
+              <a:defRPr sz="2000" kern="1200">
+                <a:solidFill>
+                  <a:schemeClr val="tx1"/>
+                </a:solidFill>
+                <a:latin typeface="+mn-lt"/>
+                <a:ea typeface="+mn-ea"/>
+                <a:cs typeface="+mn-cs"/>
+              </a:defRPr>
+            </a:lvl6pPr>
+            <a:lvl7pPr marL="2971800" indent="-228600" algn="l" defTabSz="914400" rtl="0" eaLnBrk="1" latinLnBrk="0" hangingPunct="1">
+              <a:spcBef>
+                <a:spcPct val="20000"/>
+              </a:spcBef>
+              <a:buFont typeface="Arial" pitchFamily="34" charset="0"/>
+              <a:buChar char="•"/>
+              <a:defRPr sz="2000" kern="1200">
+                <a:solidFill>
+                  <a:schemeClr val="tx1"/>
+                </a:solidFill>
+                <a:latin typeface="+mn-lt"/>
+                <a:ea typeface="+mn-ea"/>
+                <a:cs typeface="+mn-cs"/>
+              </a:defRPr>
+            </a:lvl7pPr>
+            <a:lvl8pPr marL="3429000" indent="-228600" algn="l" defTabSz="914400" rtl="0" eaLnBrk="1" latinLnBrk="0" hangingPunct="1">
+              <a:spcBef>
+                <a:spcPct val="20000"/>
+              </a:spcBef>
+              <a:buFont typeface="Arial" pitchFamily="34" charset="0"/>
+              <a:buChar char="•"/>
+              <a:defRPr sz="2000" kern="1200">
+                <a:solidFill>
+                  <a:schemeClr val="tx1"/>
+                </a:solidFill>
+                <a:latin typeface="+mn-lt"/>
+                <a:ea typeface="+mn-ea"/>
+                <a:cs typeface="+mn-cs"/>
+              </a:defRPr>
+            </a:lvl8pPr>
+            <a:lvl9pPr marL="3886200" indent="-228600" algn="l" defTabSz="914400" rtl="0" eaLnBrk="1" latinLnBrk="0" hangingPunct="1">
+              <a:spcBef>
+                <a:spcPct val="20000"/>
+              </a:spcBef>
+              <a:buFont typeface="Arial" pitchFamily="34" charset="0"/>
+              <a:buChar char="•"/>
+              <a:defRPr sz="2000" kern="1200">
+                <a:solidFill>
+                  <a:schemeClr val="tx1"/>
+                </a:solidFill>
+                <a:latin typeface="+mn-lt"/>
+                <a:ea typeface="+mn-ea"/>
+                <a:cs typeface="+mn-cs"/>
+              </a:defRPr>
+            </a:lvl9pPr>
+          </a:lstStyle>
+          <a:p>
+            <a:pPr marL="0" indent="0">
+              <a:buNone/>
+            </a:pPr>
+            <a:r>
+              <a:rPr lang="en-US" sz="2000" dirty="0">
+                <a:latin typeface="Courier New" panose="02070309020205020404" pitchFamily="49" charset="0"/>
+                <a:cs typeface="Courier New" panose="02070309020205020404" pitchFamily="49" charset="0"/>
+              </a:rPr>
+              <a:t>let en2es = {'one':'uno','two':'dos','three':'</a:t>
+            </a:r>
+            <a:r>
+              <a:rPr lang="en-US" sz="2000" dirty="0" err="1">
+                <a:latin typeface="Courier New" panose="02070309020205020404" pitchFamily="49" charset="0"/>
+                <a:cs typeface="Courier New" panose="02070309020205020404" pitchFamily="49" charset="0"/>
+              </a:rPr>
+              <a:t>tres</a:t>
+            </a:r>
+            <a:r>
+              <a:rPr lang="en-US" sz="2000" dirty="0">
+                <a:latin typeface="Courier New" panose="02070309020205020404" pitchFamily="49" charset="0"/>
+                <a:cs typeface="Courier New" panose="02070309020205020404" pitchFamily="49" charset="0"/>
+              </a:rPr>
+              <a:t>'}</a:t>
+            </a:r>
+          </a:p>
+          <a:p>
+            <a:pPr marL="0" indent="0">
+              <a:buNone/>
+            </a:pPr>
+            <a:r>
+              <a:rPr lang="en-US" sz="2000" dirty="0">
+                <a:latin typeface="Courier New" panose="02070309020205020404" pitchFamily="49" charset="0"/>
+                <a:cs typeface="Courier New" panose="02070309020205020404" pitchFamily="49" charset="0"/>
+              </a:rPr>
+              <a:t>function en2es.translate(line) </a:t>
+            </a:r>
+            <a:r>
+              <a:rPr lang="en-US" sz="2000" b="1" dirty="0" err="1">
+                <a:latin typeface="Courier New" panose="02070309020205020404" pitchFamily="49" charset="0"/>
+                <a:cs typeface="Courier New" panose="02070309020205020404" pitchFamily="49" charset="0"/>
+              </a:rPr>
+              <a:t>dict</a:t>
+            </a:r>
+            <a:br>
+              <a:rPr lang="en-US" sz="2000" dirty="0">
+                <a:latin typeface="Courier New" panose="02070309020205020404" pitchFamily="49" charset="0"/>
+                <a:cs typeface="Courier New" panose="02070309020205020404" pitchFamily="49" charset="0"/>
+              </a:rPr>
+            </a:br>
+            <a:r>
+              <a:rPr lang="en-US" sz="2000" dirty="0">
+                <a:latin typeface="Courier New" panose="02070309020205020404" pitchFamily="49" charset="0"/>
+                <a:cs typeface="Courier New" panose="02070309020205020404" pitchFamily="49" charset="0"/>
+              </a:rPr>
+              <a:t> return join(map(</a:t>
+            </a:r>
+            <a:br>
+              <a:rPr lang="en-US" sz="2000" dirty="0">
+                <a:latin typeface="Courier New" panose="02070309020205020404" pitchFamily="49" charset="0"/>
+                <a:cs typeface="Courier New" panose="02070309020205020404" pitchFamily="49" charset="0"/>
+              </a:rPr>
+            </a:br>
+            <a:r>
+              <a:rPr lang="en-US" sz="2000" dirty="0">
+                <a:latin typeface="Courier New" panose="02070309020205020404" pitchFamily="49" charset="0"/>
+                <a:cs typeface="Courier New" panose="02070309020205020404" pitchFamily="49" charset="0"/>
+              </a:rPr>
+              <a:t> split(</a:t>
+            </a:r>
+            <a:r>
+              <a:rPr lang="en-US" sz="2000" dirty="0" err="1">
+                <a:latin typeface="Courier New" panose="02070309020205020404" pitchFamily="49" charset="0"/>
+                <a:cs typeface="Courier New" panose="02070309020205020404" pitchFamily="49" charset="0"/>
+              </a:rPr>
+              <a:t>a:line</a:t>
+            </a:r>
+            <a:r>
+              <a:rPr lang="en-US" sz="2000" dirty="0">
+                <a:latin typeface="Courier New" panose="02070309020205020404" pitchFamily="49" charset="0"/>
+                <a:cs typeface="Courier New" panose="02070309020205020404" pitchFamily="49" charset="0"/>
+              </a:rPr>
+              <a:t>),'get(</a:t>
+            </a:r>
+            <a:r>
+              <a:rPr lang="en-US" sz="2000" dirty="0" err="1">
+                <a:latin typeface="Courier New" panose="02070309020205020404" pitchFamily="49" charset="0"/>
+                <a:cs typeface="Courier New" panose="02070309020205020404" pitchFamily="49" charset="0"/>
+              </a:rPr>
+              <a:t>self,v:val</a:t>
+            </a:r>
+            <a:r>
+              <a:rPr lang="en-US" sz="2000" dirty="0">
+                <a:latin typeface="Courier New" panose="02070309020205020404" pitchFamily="49" charset="0"/>
+                <a:cs typeface="Courier New" panose="02070309020205020404" pitchFamily="49" charset="0"/>
+              </a:rPr>
+              <a:t>,"???")’</a:t>
+            </a:r>
+            <a:br>
+              <a:rPr lang="en-US" sz="2000" dirty="0">
+                <a:latin typeface="Courier New" panose="02070309020205020404" pitchFamily="49" charset="0"/>
+                <a:cs typeface="Courier New" panose="02070309020205020404" pitchFamily="49" charset="0"/>
+              </a:rPr>
+            </a:br>
+            <a:r>
+              <a:rPr lang="en-US" sz="2000" dirty="0">
+                <a:latin typeface="Courier New" panose="02070309020205020404" pitchFamily="49" charset="0"/>
+                <a:cs typeface="Courier New" panose="02070309020205020404" pitchFamily="49" charset="0"/>
+              </a:rPr>
+              <a:t> )</a:t>
+            </a:r>
+            <a:br>
+              <a:rPr lang="en-US" sz="2000" dirty="0">
+                <a:latin typeface="Courier New" panose="02070309020205020404" pitchFamily="49" charset="0"/>
+                <a:cs typeface="Courier New" panose="02070309020205020404" pitchFamily="49" charset="0"/>
+              </a:rPr>
+            </a:br>
+            <a:r>
+              <a:rPr lang="en-US" sz="2000" dirty="0">
+                <a:latin typeface="Courier New" panose="02070309020205020404" pitchFamily="49" charset="0"/>
+                <a:cs typeface="Courier New" panose="02070309020205020404" pitchFamily="49" charset="0"/>
+              </a:rPr>
+              <a:t> )</a:t>
+            </a:r>
+            <a:br>
+              <a:rPr lang="en-US" sz="2000" dirty="0">
+                <a:latin typeface="Courier New" panose="02070309020205020404" pitchFamily="49" charset="0"/>
+                <a:cs typeface="Courier New" panose="02070309020205020404" pitchFamily="49" charset="0"/>
+              </a:rPr>
+            </a:br>
+            <a:r>
+              <a:rPr lang="en-US" sz="2000" dirty="0" err="1">
+                <a:latin typeface="Courier New" panose="02070309020205020404" pitchFamily="49" charset="0"/>
+                <a:cs typeface="Courier New" panose="02070309020205020404" pitchFamily="49" charset="0"/>
+              </a:rPr>
+              <a:t>endfunction</a:t>
+            </a:r>
+            <a:endParaRPr lang="en-US" sz="2000" dirty="0">
+              <a:latin typeface="Courier New" panose="02070309020205020404" pitchFamily="49" charset="0"/>
+              <a:cs typeface="Courier New" panose="02070309020205020404" pitchFamily="49" charset="0"/>
+            </a:endParaRPr>
+          </a:p>
+          <a:p>
+            <a:pPr marL="0" indent="0">
+              <a:buNone/>
+            </a:pPr>
+            <a:r>
+              <a:rPr lang="en-US" sz="2000" dirty="0">
+                <a:latin typeface="Courier New" panose="02070309020205020404" pitchFamily="49" charset="0"/>
+                <a:cs typeface="Courier New" panose="02070309020205020404" pitchFamily="49" charset="0"/>
+              </a:rPr>
+              <a:t>echo en2es.translate('one two three four’)</a:t>
+            </a:r>
+            <a:br>
+              <a:rPr lang="en-US" sz="2000" dirty="0">
+                <a:latin typeface="Courier New" panose="02070309020205020404" pitchFamily="49" charset="0"/>
+                <a:cs typeface="Courier New" panose="02070309020205020404" pitchFamily="49" charset="0"/>
+              </a:rPr>
+            </a:br>
+            <a:br>
+              <a:rPr lang="en-US" sz="2000" dirty="0">
+                <a:latin typeface="Courier New" panose="02070309020205020404" pitchFamily="49" charset="0"/>
+                <a:cs typeface="Courier New" panose="02070309020205020404" pitchFamily="49" charset="0"/>
+              </a:rPr>
+            </a:br>
+            <a:r>
+              <a:rPr lang="en-US" sz="2000" dirty="0">
+                <a:latin typeface="Courier New" panose="02070309020205020404" pitchFamily="49" charset="0"/>
+                <a:cs typeface="Courier New" panose="02070309020205020404" pitchFamily="49" charset="0"/>
+              </a:rPr>
+              <a:t>“expected output</a:t>
+            </a:r>
+            <a:br>
+              <a:rPr lang="en-US" sz="2000" dirty="0">
+                <a:latin typeface="Courier New" panose="02070309020205020404" pitchFamily="49" charset="0"/>
+                <a:cs typeface="Courier New" panose="02070309020205020404" pitchFamily="49" charset="0"/>
+              </a:rPr>
+            </a:br>
+            <a:r>
+              <a:rPr lang="en-US" sz="2000" dirty="0">
+                <a:latin typeface="Courier New" panose="02070309020205020404" pitchFamily="49" charset="0"/>
+                <a:cs typeface="Courier New" panose="02070309020205020404" pitchFamily="49" charset="0"/>
+              </a:rPr>
+              <a:t>uno dos </a:t>
+            </a:r>
+            <a:r>
+              <a:rPr lang="en-US" sz="2000" dirty="0" err="1">
+                <a:latin typeface="Courier New" panose="02070309020205020404" pitchFamily="49" charset="0"/>
+                <a:cs typeface="Courier New" panose="02070309020205020404" pitchFamily="49" charset="0"/>
+              </a:rPr>
+              <a:t>tres</a:t>
+            </a:r>
+            <a:r>
+              <a:rPr lang="en-US" sz="2000" dirty="0">
+                <a:latin typeface="Courier New" panose="02070309020205020404" pitchFamily="49" charset="0"/>
+                <a:cs typeface="Courier New" panose="02070309020205020404" pitchFamily="49" charset="0"/>
+              </a:rPr>
+              <a:t> ???</a:t>
+            </a:r>
           </a:p>
         </p:txBody>
       </p:sp>
@@ -20203,6 +21173,12 @@
             <a:r>
               <a:rPr lang="en-US" dirty="0"/>
               <a:t>Portable -- works anywhere vim is installed</a:t>
+            </a:r>
+          </a:p>
+          <a:p>
+            <a:r>
+              <a:rPr lang="en-US" dirty="0"/>
+              <a:t>Actively being developed and maintained</a:t>
             </a:r>
           </a:p>
           <a:p>

</xml_diff>